<commit_message>
Update slides for ICSE24
</commit_message>
<xml_diff>
--- a/c/icse24/presentation_icse24.pptx
+++ b/c/icse24/presentation_icse24.pptx
@@ -277,7 +277,7 @@
           <a:p>
             <a:fld id="{FA8F02CA-77CB-4E54-B712-21E588799EE8}" type="datetimeFigureOut">
               <a:rPr lang="de-DE" smtClean="0"/>
-              <a:t>09.04.2024</a:t>
+              <a:t>12.04.2024</a:t>
             </a:fld>
             <a:endParaRPr lang="de-DE"/>
           </a:p>
@@ -1178,7 +1178,7 @@
           <a:p>
             <a:r>
               <a:rPr lang="de-DE" dirty="0" err="1"/>
-              <a:t>For</a:t>
+              <a:t>To</a:t>
             </a:r>
             <a:r>
               <a:rPr lang="de-DE" dirty="0"/>
@@ -1186,7 +1186,7 @@
             </a:r>
             <a:r>
               <a:rPr lang="de-DE" dirty="0" err="1"/>
-              <a:t>our</a:t>
+              <a:t>evaluate</a:t>
             </a:r>
             <a:r>
               <a:rPr lang="de-DE" dirty="0"/>
@@ -1194,7 +1194,15 @@
             </a:r>
             <a:r>
               <a:rPr lang="de-DE" dirty="0" err="1"/>
-              <a:t>evaluation</a:t>
+              <a:t>the</a:t>
+            </a:r>
+            <a:r>
+              <a:rPr lang="de-DE" dirty="0"/>
+              <a:t> </a:t>
+            </a:r>
+            <a:r>
+              <a:rPr lang="de-DE" dirty="0" err="1"/>
+              <a:t>approach</a:t>
             </a:r>
             <a:r>
               <a:rPr lang="de-DE" dirty="0"/>
@@ -1209,16 +1217,38 @@
               <a:t> </a:t>
             </a:r>
             <a:r>
-              <a:rPr lang="de-DE" dirty="0" err="1"/>
+              <a:rPr lang="de-DE" b="1" dirty="0" err="1"/>
               <a:t>applied</a:t>
             </a:r>
             <a:r>
-              <a:rPr lang="de-DE" dirty="0"/>
+              <a:rPr lang="de-DE" b="1" dirty="0"/>
               <a:t> </a:t>
             </a:r>
             <a:r>
-              <a:rPr lang="de-DE" dirty="0" err="1"/>
-              <a:t>our</a:t>
+              <a:rPr lang="de-DE" b="1" dirty="0" err="1"/>
+              <a:t>it</a:t>
+            </a:r>
+            <a:r>
+              <a:rPr lang="de-DE" b="1" dirty="0"/>
+              <a:t> on 5 </a:t>
+            </a:r>
+            <a:r>
+              <a:rPr lang="de-DE" b="1" dirty="0" err="1"/>
+              <a:t>projects</a:t>
+            </a:r>
+            <a:r>
+              <a:rPr lang="de-DE" dirty="0"/>
+              <a:t>.</a:t>
+            </a:r>
+          </a:p>
+          <a:p>
+            <a:r>
+              <a:rPr lang="de-DE" dirty="0"/>
+              <a:t>All </a:t>
+            </a:r>
+            <a:r>
+              <a:rPr lang="de-DE" dirty="0" err="1"/>
+              <a:t>these</a:t>
             </a:r>
             <a:r>
               <a:rPr lang="de-DE" dirty="0"/>
@@ -1226,29 +1256,57 @@
             </a:r>
             <a:r>
               <a:rPr lang="de-DE" dirty="0" err="1"/>
-              <a:t>approaches</a:t>
-            </a:r>
-            <a:r>
-              <a:rPr lang="de-DE" dirty="0"/>
-              <a:t> on 5 </a:t>
-            </a:r>
-            <a:r>
-              <a:rPr lang="de-DE" dirty="0" err="1"/>
               <a:t>projects</a:t>
             </a:r>
             <a:r>
               <a:rPr lang="de-DE" dirty="0"/>
+              <a:t> </a:t>
+            </a:r>
+            <a:r>
+              <a:rPr lang="de-DE" b="1" dirty="0" err="1"/>
+              <a:t>have</a:t>
+            </a:r>
+            <a:r>
+              <a:rPr lang="de-DE" b="1" dirty="0"/>
+              <a:t> different </a:t>
+            </a:r>
+            <a:r>
+              <a:rPr lang="de-DE" b="1" dirty="0" err="1"/>
+              <a:t>characteristics</a:t>
+            </a:r>
+            <a:r>
+              <a:rPr lang="de-DE" b="1" dirty="0"/>
+              <a:t> </a:t>
+            </a:r>
+            <a:r>
+              <a:rPr lang="de-DE" dirty="0"/>
+              <a:t>like different </a:t>
+            </a:r>
+            <a:r>
+              <a:rPr lang="de-DE" b="1" dirty="0" err="1"/>
+              <a:t>domains</a:t>
+            </a:r>
+            <a:r>
+              <a:rPr lang="de-DE" dirty="0"/>
               <a:t>.</a:t>
             </a:r>
           </a:p>
           <a:p>
             <a:r>
               <a:rPr lang="de-DE" dirty="0"/>
-              <a:t>All </a:t>
-            </a:r>
-            <a:r>
-              <a:rPr lang="de-DE" dirty="0" err="1"/>
-              <a:t>these</a:t>
+              <a:t>The </a:t>
+            </a:r>
+            <a:r>
+              <a:rPr lang="de-DE" dirty="0" err="1"/>
+              <a:t>projects</a:t>
+            </a:r>
+            <a:r>
+              <a:rPr lang="de-DE" dirty="0"/>
+              <a:t> also all </a:t>
+            </a:r>
+            <a:r>
+              <a:rPr lang="de-DE" dirty="0" err="1"/>
+              <a:t>have</a:t>
             </a:r>
             <a:r>
               <a:rPr lang="de-DE" dirty="0"/>
@@ -1256,6 +1314,44 @@
             </a:r>
             <a:r>
               <a:rPr lang="de-DE" dirty="0" err="1"/>
+              <a:t>differently</a:t>
+            </a:r>
+            <a:r>
+              <a:rPr lang="de-DE" dirty="0"/>
+              <a:t> </a:t>
+            </a:r>
+            <a:r>
+              <a:rPr lang="de-DE" b="1" dirty="0" err="1"/>
+              <a:t>sized</a:t>
+            </a:r>
+            <a:r>
+              <a:rPr lang="de-DE" dirty="0"/>
+              <a:t> </a:t>
+            </a:r>
+            <a:r>
+              <a:rPr lang="de-DE" dirty="0" err="1"/>
+              <a:t>artifacts</a:t>
+            </a:r>
+            <a:r>
+              <a:rPr lang="de-DE" dirty="0"/>
+              <a:t>.</a:t>
+            </a:r>
+          </a:p>
+          <a:p>
+            <a:r>
+              <a:rPr lang="de-DE" dirty="0"/>
+              <a:t>The </a:t>
+            </a:r>
+            <a:r>
+              <a:rPr lang="de-DE" dirty="0" err="1"/>
+              <a:t>two</a:t>
+            </a:r>
+            <a:r>
+              <a:rPr lang="de-DE" dirty="0"/>
+              <a:t> </a:t>
+            </a:r>
+            <a:r>
+              <a:rPr lang="de-DE" dirty="0" err="1"/>
               <a:t>projects</a:t>
             </a:r>
             <a:r>
@@ -1264,41 +1360,43 @@
             </a:r>
             <a:r>
               <a:rPr lang="de-DE" dirty="0" err="1"/>
-              <a:t>have</a:t>
-            </a:r>
-            <a:r>
-              <a:rPr lang="de-DE" dirty="0"/>
-              <a:t> different </a:t>
-            </a:r>
-            <a:r>
-              <a:rPr lang="de-DE" dirty="0" err="1"/>
-              <a:t>characteristics</a:t>
-            </a:r>
-            <a:r>
-              <a:rPr lang="de-DE" dirty="0"/>
-              <a:t>.</a:t>
-            </a:r>
-          </a:p>
-          <a:p>
-            <a:r>
-              <a:rPr lang="de-DE" dirty="0"/>
-              <a:t>This </a:t>
-            </a:r>
-            <a:r>
-              <a:rPr lang="de-DE" dirty="0" err="1"/>
-              <a:t>includes</a:t>
-            </a:r>
-            <a:r>
-              <a:rPr lang="de-DE" dirty="0"/>
-              <a:t> different </a:t>
-            </a:r>
-            <a:r>
-              <a:rPr lang="de-DE" dirty="0" err="1"/>
-              <a:t>domains</a:t>
-            </a:r>
-            <a:r>
-              <a:rPr lang="de-DE" dirty="0"/>
-              <a:t> but </a:t>
+              <a:t>MediaStore</a:t>
+            </a:r>
+            <a:r>
+              <a:rPr lang="de-DE" dirty="0"/>
+              <a:t> and </a:t>
+            </a:r>
+            <a:r>
+              <a:rPr lang="de-DE" dirty="0" err="1"/>
+              <a:t>TeaStore</a:t>
+            </a:r>
+            <a:r>
+              <a:rPr lang="de-DE" dirty="0"/>
+              <a:t> </a:t>
+            </a:r>
+            <a:r>
+              <a:rPr lang="de-DE" dirty="0" err="1"/>
+              <a:t>are</a:t>
+            </a:r>
+            <a:r>
+              <a:rPr lang="de-DE" dirty="0"/>
+              <a:t> </a:t>
+            </a:r>
+            <a:r>
+              <a:rPr lang="de-DE" b="1" dirty="0" err="1"/>
+              <a:t>academic</a:t>
+            </a:r>
+            <a:r>
+              <a:rPr lang="de-DE" b="1" dirty="0"/>
+              <a:t> </a:t>
+            </a:r>
+            <a:r>
+              <a:rPr lang="de-DE" b="1" dirty="0" err="1"/>
+              <a:t>projects</a:t>
+            </a:r>
+            <a:r>
+              <a:rPr lang="de-DE" dirty="0"/>
+              <a:t>; </a:t>
             </a:r>
             <a:r>
               <a:rPr lang="de-DE" dirty="0" err="1"/>
@@ -1310,172 +1408,50 @@
             </a:r>
             <a:r>
               <a:rPr lang="de-DE" dirty="0" err="1"/>
+              <a:t>other</a:t>
+            </a:r>
+            <a:r>
+              <a:rPr lang="de-DE" dirty="0"/>
+              <a:t> </a:t>
+            </a:r>
+            <a:r>
+              <a:rPr lang="de-DE" dirty="0" err="1"/>
+              <a:t>three</a:t>
+            </a:r>
+            <a:r>
+              <a:rPr lang="de-DE" dirty="0"/>
+              <a:t> </a:t>
+            </a:r>
+            <a:r>
+              <a:rPr lang="de-DE" dirty="0" err="1"/>
               <a:t>projects</a:t>
             </a:r>
             <a:r>
               <a:rPr lang="de-DE" dirty="0"/>
-              <a:t> and </a:t>
-            </a:r>
-            <a:r>
-              <a:rPr lang="de-DE" dirty="0" err="1"/>
-              <a:t>their</a:t>
-            </a:r>
-            <a:r>
-              <a:rPr lang="de-DE" dirty="0"/>
               <a:t> </a:t>
             </a:r>
             <a:r>
               <a:rPr lang="de-DE" dirty="0" err="1"/>
-              <a:t>corresponding</a:t>
+              <a:t>are</a:t>
             </a:r>
             <a:r>
               <a:rPr lang="de-DE" dirty="0"/>
               <a:t> </a:t>
             </a:r>
             <a:r>
-              <a:rPr lang="de-DE" dirty="0" err="1"/>
-              <a:t>artifacts</a:t>
-            </a:r>
-            <a:r>
-              <a:rPr lang="de-DE" dirty="0"/>
+              <a:rPr lang="de-DE" b="1" dirty="0"/>
+              <a:t>open source </a:t>
+            </a:r>
+            <a:r>
+              <a:rPr lang="de-DE" b="1" dirty="0" err="1"/>
+              <a:t>software</a:t>
+            </a:r>
+            <a:r>
+              <a:rPr lang="de-DE" b="1" dirty="0"/>
               <a:t> </a:t>
             </a:r>
             <a:r>
-              <a:rPr lang="de-DE" dirty="0" err="1"/>
-              <a:t>are</a:t>
-            </a:r>
-            <a:r>
-              <a:rPr lang="de-DE" dirty="0"/>
-              <a:t> also all </a:t>
-            </a:r>
-            <a:r>
-              <a:rPr lang="de-DE" dirty="0" err="1"/>
-              <a:t>differently</a:t>
-            </a:r>
-            <a:r>
-              <a:rPr lang="de-DE" dirty="0"/>
-              <a:t> </a:t>
-            </a:r>
-            <a:r>
-              <a:rPr lang="de-DE" dirty="0" err="1"/>
-              <a:t>sized</a:t>
-            </a:r>
-            <a:r>
-              <a:rPr lang="de-DE" dirty="0"/>
-              <a:t>.</a:t>
-            </a:r>
-          </a:p>
-          <a:p>
-            <a:r>
-              <a:rPr lang="de-DE" dirty="0"/>
-              <a:t>The </a:t>
-            </a:r>
-            <a:r>
-              <a:rPr lang="de-DE" dirty="0" err="1"/>
-              <a:t>two</a:t>
-            </a:r>
-            <a:r>
-              <a:rPr lang="de-DE" dirty="0"/>
-              <a:t> </a:t>
-            </a:r>
-            <a:r>
-              <a:rPr lang="de-DE" dirty="0" err="1"/>
-              <a:t>projects</a:t>
-            </a:r>
-            <a:r>
-              <a:rPr lang="de-DE" dirty="0"/>
-              <a:t> </a:t>
-            </a:r>
-            <a:r>
-              <a:rPr lang="de-DE" dirty="0" err="1"/>
-              <a:t>MediaStore</a:t>
-            </a:r>
-            <a:r>
-              <a:rPr lang="de-DE" dirty="0"/>
-              <a:t> and </a:t>
-            </a:r>
-            <a:r>
-              <a:rPr lang="de-DE" dirty="0" err="1"/>
-              <a:t>TeaStore</a:t>
-            </a:r>
-            <a:r>
-              <a:rPr lang="de-DE" dirty="0"/>
-              <a:t> </a:t>
-            </a:r>
-            <a:r>
-              <a:rPr lang="de-DE" dirty="0" err="1"/>
-              <a:t>are</a:t>
-            </a:r>
-            <a:r>
-              <a:rPr lang="de-DE" dirty="0"/>
-              <a:t> </a:t>
-            </a:r>
-            <a:r>
-              <a:rPr lang="de-DE" dirty="0" err="1"/>
-              <a:t>academic</a:t>
-            </a:r>
-            <a:r>
-              <a:rPr lang="de-DE" dirty="0"/>
-              <a:t> </a:t>
-            </a:r>
-            <a:r>
-              <a:rPr lang="de-DE" dirty="0" err="1"/>
-              <a:t>projects</a:t>
-            </a:r>
-            <a:r>
-              <a:rPr lang="de-DE" dirty="0"/>
-              <a:t>; </a:t>
-            </a:r>
-            <a:r>
-              <a:rPr lang="de-DE" dirty="0" err="1"/>
-              <a:t>the</a:t>
-            </a:r>
-            <a:r>
-              <a:rPr lang="de-DE" dirty="0"/>
-              <a:t> </a:t>
-            </a:r>
-            <a:r>
-              <a:rPr lang="de-DE" dirty="0" err="1"/>
-              <a:t>other</a:t>
-            </a:r>
-            <a:r>
-              <a:rPr lang="de-DE" dirty="0"/>
-              <a:t> </a:t>
-            </a:r>
-            <a:r>
-              <a:rPr lang="de-DE" dirty="0" err="1"/>
-              <a:t>three</a:t>
-            </a:r>
-            <a:r>
-              <a:rPr lang="de-DE" dirty="0"/>
-              <a:t> </a:t>
-            </a:r>
-            <a:r>
-              <a:rPr lang="de-DE" dirty="0" err="1"/>
-              <a:t>projects</a:t>
-            </a:r>
-            <a:r>
-              <a:rPr lang="de-DE" dirty="0"/>
-              <a:t> </a:t>
-            </a:r>
-            <a:r>
-              <a:rPr lang="de-DE" dirty="0" err="1"/>
-              <a:t>are</a:t>
-            </a:r>
-            <a:r>
-              <a:rPr lang="de-DE" dirty="0"/>
-              <a:t> open source </a:t>
-            </a:r>
-            <a:r>
-              <a:rPr lang="de-DE" dirty="0" err="1"/>
-              <a:t>software</a:t>
-            </a:r>
-            <a:r>
-              <a:rPr lang="de-DE" dirty="0"/>
-              <a:t> </a:t>
-            </a:r>
-            <a:r>
-              <a:rPr lang="de-DE" dirty="0" err="1"/>
+              <a:rPr lang="de-DE" b="1" dirty="0" err="1"/>
               <a:t>systems</a:t>
             </a:r>
             <a:r>
@@ -1618,28 +1594,32 @@
               <a:t> </a:t>
             </a:r>
             <a:r>
-              <a:rPr lang="de-DE" dirty="0" err="1"/>
+              <a:rPr lang="de-DE" b="1" dirty="0" err="1"/>
               <a:t>answer</a:t>
             </a:r>
             <a:r>
-              <a:rPr lang="de-DE" dirty="0"/>
+              <a:rPr lang="de-DE" b="1" dirty="0"/>
               <a:t> </a:t>
             </a:r>
             <a:r>
-              <a:rPr lang="de-DE" dirty="0" err="1"/>
+              <a:rPr lang="de-DE" b="1" dirty="0" err="1"/>
               <a:t>research</a:t>
             </a:r>
             <a:r>
-              <a:rPr lang="de-DE" dirty="0"/>
+              <a:rPr lang="de-DE" b="1" dirty="0"/>
               <a:t> </a:t>
             </a:r>
             <a:r>
-              <a:rPr lang="de-DE" dirty="0" err="1"/>
+              <a:rPr lang="de-DE" b="1" dirty="0" err="1"/>
               <a:t>question</a:t>
             </a:r>
             <a:r>
-              <a:rPr lang="de-DE" dirty="0"/>
-              <a:t> 1, </a:t>
+              <a:rPr lang="de-DE" b="1" dirty="0"/>
+              <a:t> 1</a:t>
+            </a:r>
+            <a:r>
+              <a:rPr lang="de-DE" dirty="0"/>
+              <a:t>, </a:t>
             </a:r>
             <a:r>
               <a:rPr lang="de-DE" dirty="0" err="1"/>
@@ -1698,19 +1678,19 @@
               <a:t> </a:t>
             </a:r>
             <a:r>
-              <a:rPr lang="de-DE" dirty="0" err="1"/>
+              <a:rPr lang="de-DE" b="1" dirty="0" err="1"/>
               <a:t>excellent</a:t>
             </a:r>
             <a:r>
-              <a:rPr lang="de-DE" dirty="0"/>
+              <a:rPr lang="de-DE" b="1" dirty="0"/>
               <a:t> </a:t>
             </a:r>
             <a:r>
-              <a:rPr lang="de-DE" dirty="0" err="1"/>
+              <a:rPr lang="de-DE" b="1" dirty="0" err="1"/>
               <a:t>results</a:t>
             </a:r>
             <a:r>
-              <a:rPr lang="de-DE" dirty="0"/>
+              <a:rPr lang="de-DE" b="1" dirty="0"/>
               <a:t> </a:t>
             </a:r>
             <a:r>
@@ -1744,19 +1724,19 @@
               <a:t>The </a:t>
             </a:r>
             <a:r>
-              <a:rPr lang="de-DE" dirty="0" err="1"/>
+              <a:rPr lang="de-DE" b="1" dirty="0" err="1"/>
               <a:t>semantic</a:t>
             </a:r>
             <a:r>
-              <a:rPr lang="de-DE" dirty="0"/>
+              <a:rPr lang="de-DE" b="1" dirty="0"/>
               <a:t> </a:t>
             </a:r>
             <a:r>
-              <a:rPr lang="de-DE" dirty="0" err="1"/>
+              <a:rPr lang="de-DE" b="1" dirty="0" err="1"/>
               <a:t>gap</a:t>
             </a:r>
             <a:r>
-              <a:rPr lang="de-DE" dirty="0"/>
+              <a:rPr lang="de-DE" b="1" dirty="0"/>
               <a:t> </a:t>
             </a:r>
             <a:r>
@@ -1800,27 +1780,27 @@
               <a:t> and code </a:t>
             </a:r>
             <a:r>
-              <a:rPr lang="de-DE" dirty="0" err="1"/>
+              <a:rPr lang="de-DE" b="1" dirty="0" err="1"/>
               <a:t>seems</a:t>
             </a:r>
             <a:r>
-              <a:rPr lang="de-DE" dirty="0"/>
+              <a:rPr lang="de-DE" b="1" dirty="0"/>
               <a:t> </a:t>
             </a:r>
             <a:r>
-              <a:rPr lang="de-DE" dirty="0" err="1"/>
+              <a:rPr lang="de-DE" b="1" dirty="0" err="1"/>
               <a:t>small</a:t>
             </a:r>
             <a:r>
-              <a:rPr lang="de-DE" dirty="0"/>
+              <a:rPr lang="de-DE" b="1" dirty="0"/>
               <a:t> </a:t>
             </a:r>
             <a:r>
-              <a:rPr lang="de-DE" dirty="0" err="1"/>
+              <a:rPr lang="de-DE" b="1" dirty="0" err="1"/>
               <a:t>enough</a:t>
             </a:r>
             <a:r>
-              <a:rPr lang="de-DE" dirty="0"/>
+              <a:rPr lang="de-DE" b="1" dirty="0"/>
               <a:t> </a:t>
             </a:r>
             <a:r>
@@ -2135,15 +2115,15 @@
               <a:t> </a:t>
             </a:r>
             <a:r>
-              <a:rPr lang="de-DE" dirty="0" err="1"/>
+              <a:rPr lang="de-DE" b="1" dirty="0" err="1"/>
               <a:t>required</a:t>
             </a:r>
             <a:r>
-              <a:rPr lang="de-DE" dirty="0"/>
+              <a:rPr lang="de-DE" b="1" dirty="0"/>
               <a:t> </a:t>
             </a:r>
             <a:r>
-              <a:rPr lang="de-DE" dirty="0" err="1"/>
+              <a:rPr lang="de-DE" b="1" dirty="0" err="1"/>
               <a:t>approaches</a:t>
             </a:r>
             <a:r>
@@ -2186,7 +2166,7 @@
               <a:t> </a:t>
             </a:r>
             <a:r>
-              <a:rPr lang="de-DE" dirty="0" err="1"/>
+              <a:rPr lang="de-DE" b="1" dirty="0" err="1"/>
               <a:t>ArDoCo</a:t>
             </a:r>
             <a:r>
@@ -2306,7 +2286,7 @@
               <a:t> </a:t>
             </a:r>
             <a:r>
-              <a:rPr lang="de-DE" dirty="0" err="1"/>
+              <a:rPr lang="de-DE" b="1" dirty="0" err="1"/>
               <a:t>ArCoTL</a:t>
             </a:r>
             <a:r>
@@ -2481,14 +2461,18 @@
             </a:r>
             <a:r>
               <a:rPr lang="de-DE" dirty="0"/>
-              <a:t> transitive </a:t>
-            </a:r>
-            <a:r>
-              <a:rPr lang="de-DE" dirty="0" err="1"/>
+              <a:t> </a:t>
+            </a:r>
+            <a:r>
+              <a:rPr lang="de-DE" b="1" dirty="0"/>
+              <a:t>transitive </a:t>
+            </a:r>
+            <a:r>
+              <a:rPr lang="de-DE" b="1" dirty="0" err="1"/>
               <a:t>approach</a:t>
             </a:r>
             <a:r>
-              <a:rPr lang="de-DE" dirty="0"/>
+              <a:rPr lang="de-DE" b="1" dirty="0"/>
               <a:t> </a:t>
             </a:r>
             <a:r>
@@ -2516,7 +2500,7 @@
               <a:t> </a:t>
             </a:r>
             <a:r>
-              <a:rPr lang="de-DE" dirty="0" err="1"/>
+              <a:rPr lang="de-DE" b="1" dirty="0" err="1"/>
               <a:t>TransArC</a:t>
             </a:r>
             <a:r>
@@ -2534,27 +2518,27 @@
               <a:t> </a:t>
             </a:r>
             <a:r>
-              <a:rPr lang="de-DE" dirty="0" err="1"/>
+              <a:rPr lang="de-DE" b="1" dirty="0" err="1"/>
               <a:t>simply</a:t>
             </a:r>
             <a:r>
-              <a:rPr lang="de-DE" dirty="0"/>
+              <a:rPr lang="de-DE" b="1" dirty="0"/>
               <a:t> </a:t>
             </a:r>
             <a:r>
-              <a:rPr lang="de-DE" dirty="0" err="1"/>
+              <a:rPr lang="de-DE" b="1" dirty="0" err="1"/>
               <a:t>combines</a:t>
             </a:r>
             <a:r>
-              <a:rPr lang="de-DE" dirty="0"/>
+              <a:rPr lang="de-DE" b="1" dirty="0"/>
               <a:t> </a:t>
             </a:r>
             <a:r>
-              <a:rPr lang="de-DE" dirty="0" err="1"/>
+              <a:rPr lang="de-DE" b="1" dirty="0" err="1"/>
               <a:t>the</a:t>
             </a:r>
             <a:r>
-              <a:rPr lang="de-DE" dirty="0"/>
+              <a:rPr lang="de-DE" b="1" dirty="0"/>
               <a:t> trace links </a:t>
             </a:r>
             <a:r>
@@ -2738,13 +2722,29 @@
             </a:r>
             <a:r>
               <a:rPr lang="en-GB" noProof="0" dirty="0"/>
-              <a:t>, we again used the same projects as in our previous evaluation.</a:t>
-            </a:r>
-          </a:p>
-          <a:p>
+              <a:t>, we again used </a:t>
+            </a:r>
+            <a:r>
+              <a:rPr lang="en-GB" b="1" noProof="0" dirty="0"/>
+              <a:t>the same projects </a:t>
+            </a:r>
             <a:r>
               <a:rPr lang="en-GB" noProof="0" dirty="0"/>
-              <a:t>For comparison, we need several baseline approaches.</a:t>
+              <a:t>as in our previous evaluation.</a:t>
+            </a:r>
+          </a:p>
+          <a:p>
+            <a:r>
+              <a:rPr lang="en-GB" noProof="0" dirty="0"/>
+              <a:t>For comparison, we need </a:t>
+            </a:r>
+            <a:r>
+              <a:rPr lang="en-GB" b="1" noProof="0" dirty="0"/>
+              <a:t>several baseline approaches</a:t>
+            </a:r>
+            <a:r>
+              <a:rPr lang="en-GB" noProof="0" dirty="0"/>
+              <a:t>.</a:t>
             </a:r>
           </a:p>
           <a:p>
@@ -2767,7 +2767,15 @@
             </a:pPr>
             <a:r>
               <a:rPr lang="en-GB" noProof="0" dirty="0"/>
-              <a:t>While there is no approach that covers the exact same problem, we can use and adapt approaches that tackle similar problems.</a:t>
+              <a:t>While there is no approach that covers the exact same problem, we can </a:t>
+            </a:r>
+            <a:r>
+              <a:rPr lang="en-GB" b="1" noProof="0" dirty="0"/>
+              <a:t>use and adapt approaches </a:t>
+            </a:r>
+            <a:r>
+              <a:rPr lang="en-GB" noProof="0" dirty="0"/>
+              <a:t>that tackle similar problems.</a:t>
             </a:r>
           </a:p>
           <a:p>
@@ -2779,7 +2787,23 @@
           <a:p>
             <a:r>
               <a:rPr lang="en-GB" noProof="0" dirty="0"/>
-              <a:t>We have the two Information Retrieval-based approaches TAROT and FTLR that are recent well-performing approaches for Requirements-to-code traceability.</a:t>
+              <a:t>We have the two Information Retrieval-based approaches </a:t>
+            </a:r>
+            <a:r>
+              <a:rPr lang="en-GB" b="1" noProof="0" dirty="0"/>
+              <a:t>TAROT</a:t>
+            </a:r>
+            <a:r>
+              <a:rPr lang="en-GB" noProof="0" dirty="0"/>
+              <a:t> and </a:t>
+            </a:r>
+            <a:r>
+              <a:rPr lang="en-GB" b="1" noProof="0" dirty="0"/>
+              <a:t>FTLR</a:t>
+            </a:r>
+            <a:r>
+              <a:rPr lang="en-GB" noProof="0" dirty="0"/>
+              <a:t> that are recent well-performing approaches for Requirements-to-code traceability.</a:t>
             </a:r>
           </a:p>
           <a:p>
@@ -2788,7 +2812,7 @@
               <a:t>Additionally, we have the approach </a:t>
             </a:r>
             <a:r>
-              <a:rPr lang="en-GB" noProof="0" dirty="0" err="1"/>
+              <a:rPr lang="en-GB" b="1" noProof="0" dirty="0" err="1"/>
               <a:t>CodeBERT</a:t>
             </a:r>
             <a:r>
@@ -2799,15 +2823,23 @@
           <a:p>
             <a:r>
               <a:rPr lang="en-GB" noProof="0" dirty="0"/>
-              <a:t>Lastly, we adapted the </a:t>
-            </a:r>
-            <a:r>
-              <a:rPr lang="en-GB" noProof="0" dirty="0" err="1"/>
+              <a:t>Lastly, we </a:t>
+            </a:r>
+            <a:r>
+              <a:rPr lang="en-GB" b="1" noProof="0" dirty="0"/>
+              <a:t>adapted the </a:t>
+            </a:r>
+            <a:r>
+              <a:rPr lang="en-GB" b="1" noProof="0" dirty="0" err="1"/>
               <a:t>ArDoCo</a:t>
             </a:r>
             <a:r>
+              <a:rPr lang="en-GB" b="1" noProof="0" dirty="0"/>
+              <a:t> approach </a:t>
+            </a:r>
+            <a:r>
               <a:rPr lang="en-GB" noProof="0" dirty="0"/>
-              <a:t> approach slightly: We use the code model in place of the architecture model, which allows us to directly create trace links between documentation and code.</a:t>
+              <a:t>slightly: We use the code model in place of the architecture model, which allows us to directly create trace links between documentation and code.</a:t>
             </a:r>
           </a:p>
           <a:p>
@@ -2914,7 +2946,23 @@
             </a:pPr>
             <a:r>
               <a:rPr lang="en-GB" noProof="0" dirty="0"/>
-              <a:t>Looking at the second research question, we can state that we have excellent results for </a:t>
+              <a:t>Looking at the </a:t>
+            </a:r>
+            <a:r>
+              <a:rPr lang="en-GB" b="1" noProof="0" dirty="0"/>
+              <a:t>second research question</a:t>
+            </a:r>
+            <a:r>
+              <a:rPr lang="en-GB" noProof="0" dirty="0"/>
+              <a:t>, we can state that we </a:t>
+            </a:r>
+            <a:r>
+              <a:rPr lang="en-GB" b="1" noProof="0" dirty="0"/>
+              <a:t>have excellent results </a:t>
+            </a:r>
+            <a:r>
+              <a:rPr lang="en-GB" noProof="0" dirty="0"/>
+              <a:t>for </a:t>
             </a:r>
             <a:r>
               <a:rPr lang="en-GB" noProof="0" dirty="0" err="1"/>
@@ -2932,7 +2980,15 @@
             </a:pPr>
             <a:r>
               <a:rPr lang="en-GB" noProof="0" dirty="0"/>
-              <a:t>Further, we can answer research question three by comparing the results of </a:t>
+              <a:t>Further, we can answer </a:t>
+            </a:r>
+            <a:r>
+              <a:rPr lang="en-GB" b="1" noProof="0" dirty="0"/>
+              <a:t>research question three by comparing </a:t>
+            </a:r>
+            <a:r>
+              <a:rPr lang="en-GB" noProof="0" dirty="0"/>
+              <a:t>the results of </a:t>
             </a:r>
             <a:r>
               <a:rPr lang="en-GB" noProof="0" dirty="0" err="1"/>
@@ -2958,7 +3014,15 @@
             </a:r>
             <a:r>
               <a:rPr lang="en-GB" noProof="0" dirty="0"/>
-              <a:t> significantly outperforms the baseline approaches.</a:t>
+              <a:t> </a:t>
+            </a:r>
+            <a:r>
+              <a:rPr lang="en-GB" b="1" noProof="0" dirty="0"/>
+              <a:t>significantly outperforms </a:t>
+            </a:r>
+            <a:r>
+              <a:rPr lang="en-GB" noProof="0" dirty="0"/>
+              <a:t>the baseline approaches.</a:t>
             </a:r>
           </a:p>
           <a:p>
@@ -3076,7 +3140,15 @@
           <a:p>
             <a:r>
               <a:rPr lang="en-GB" noProof="0" dirty="0"/>
-              <a:t>To conclude, we created an approach to transitively recover trace links between architecture documentation and code.</a:t>
+              <a:t>To </a:t>
+            </a:r>
+            <a:r>
+              <a:rPr lang="en-GB" b="1" noProof="0" dirty="0"/>
+              <a:t>conclude</a:t>
+            </a:r>
+            <a:r>
+              <a:rPr lang="en-GB" noProof="0" dirty="0"/>
+              <a:t>, we created an approach to transitively recover trace links between architecture documentation and code.</a:t>
             </a:r>
           </a:p>
           <a:p>
@@ -3085,50 +3157,127 @@
               <a:t>Our approach </a:t>
             </a:r>
             <a:r>
+              <a:rPr lang="en-GB" b="1" noProof="0" dirty="0" err="1"/>
+              <a:t>TransArC</a:t>
+            </a:r>
+            <a:r>
+              <a:rPr lang="en-GB" noProof="0" dirty="0"/>
+              <a:t> </a:t>
+            </a:r>
+            <a:r>
+              <a:rPr lang="en-GB" b="1" noProof="0" dirty="0"/>
+              <a:t>uses</a:t>
+            </a:r>
+            <a:r>
+              <a:rPr lang="en-GB" noProof="0" dirty="0"/>
+              <a:t> the existing approach </a:t>
+            </a:r>
+            <a:r>
+              <a:rPr lang="en-GB" b="1" noProof="0" dirty="0" err="1"/>
+              <a:t>ArDoCo</a:t>
+            </a:r>
+            <a:r>
+              <a:rPr lang="en-GB" noProof="0" dirty="0"/>
+              <a:t> and our new approach </a:t>
+            </a:r>
+            <a:r>
+              <a:rPr lang="en-GB" b="1" noProof="0" dirty="0" err="1"/>
+              <a:t>ArCoTL</a:t>
+            </a:r>
+            <a:r>
+              <a:rPr lang="en-GB" noProof="0" dirty="0"/>
+              <a:t> to try to </a:t>
+            </a:r>
+            <a:r>
+              <a:rPr lang="en-GB" b="1" noProof="0" dirty="0"/>
+              <a:t>bridge the semantic gap using software architecture models as intermediate artifacts</a:t>
+            </a:r>
+            <a:r>
+              <a:rPr lang="en-GB" noProof="0" dirty="0"/>
+              <a:t>.</a:t>
+            </a:r>
+          </a:p>
+          <a:p>
+            <a:r>
+              <a:rPr lang="en-GB" noProof="0" dirty="0"/>
+              <a:t>In our </a:t>
+            </a:r>
+            <a:r>
+              <a:rPr lang="en-GB" b="1" noProof="0" dirty="0"/>
+              <a:t>evaluation</a:t>
+            </a:r>
+            <a:r>
+              <a:rPr lang="en-GB" noProof="0" dirty="0"/>
+              <a:t>, we showed that the </a:t>
+            </a:r>
+            <a:r>
+              <a:rPr lang="en-GB" noProof="0" dirty="0" err="1"/>
+              <a:t>ArCoTL</a:t>
+            </a:r>
+            <a:r>
+              <a:rPr lang="en-GB" noProof="0" dirty="0"/>
+              <a:t> approach performs excellently and </a:t>
+            </a:r>
+            <a:r>
               <a:rPr lang="en-GB" noProof="0" dirty="0" err="1"/>
               <a:t>TransArC</a:t>
             </a:r>
             <a:r>
               <a:rPr lang="en-GB" noProof="0" dirty="0"/>
-              <a:t> uses the existing approach </a:t>
-            </a:r>
-            <a:r>
-              <a:rPr lang="en-GB" noProof="0" dirty="0" err="1"/>
-              <a:t>ArDoCo</a:t>
-            </a:r>
+              <a:t> significantly outperforms the baseline approaches.</a:t>
+            </a:r>
+          </a:p>
+          <a:p>
+            <a:endParaRPr lang="en-GB" noProof="0" dirty="0"/>
+          </a:p>
+          <a:p>
             <a:r>
               <a:rPr lang="en-GB" noProof="0" dirty="0"/>
-              <a:t> and our new approach </a:t>
-            </a:r>
-            <a:r>
-              <a:rPr lang="en-GB" noProof="0" dirty="0" err="1"/>
-              <a:t>ArCoTL</a:t>
+              <a:t>In </a:t>
+            </a:r>
+            <a:r>
+              <a:rPr lang="en-GB" b="1" noProof="0" dirty="0"/>
+              <a:t>future work</a:t>
             </a:r>
             <a:r>
               <a:rPr lang="en-GB" noProof="0" dirty="0"/>
-              <a:t> to try to bridge the semantic gap using software architecture models as intermediate artifacts.</a:t>
-            </a:r>
-          </a:p>
-          <a:p>
+              <a:t>, we want to </a:t>
+            </a:r>
+            <a:r>
+              <a:rPr lang="en-GB" b="1" noProof="0" dirty="0"/>
+              <a:t>further evaluate </a:t>
+            </a:r>
             <a:r>
               <a:rPr lang="en-GB" noProof="0" dirty="0"/>
-              <a:t>In our evaluation, we showed that the </a:t>
-            </a:r>
-            <a:r>
-              <a:rPr lang="en-GB" noProof="0" dirty="0" err="1"/>
-              <a:t>ArCoTL</a:t>
-            </a:r>
+              <a:t>the approach on more different projects.</a:t>
+            </a:r>
+          </a:p>
+          <a:p>
             <a:r>
               <a:rPr lang="en-GB" noProof="0" dirty="0"/>
-              <a:t> approach performs excellently and </a:t>
-            </a:r>
-            <a:r>
-              <a:rPr lang="en-GB" noProof="0" dirty="0" err="1"/>
-              <a:t>TransArC</a:t>
+              <a:t>We also plan to </a:t>
+            </a:r>
+            <a:r>
+              <a:rPr lang="en-GB" b="1" noProof="0" dirty="0"/>
+              <a:t>experiment with other kinds of artifacts</a:t>
             </a:r>
             <a:r>
               <a:rPr lang="en-GB" noProof="0" dirty="0"/>
-              <a:t> significantly outperforms the baseline approaches.</a:t>
+              <a:t>, either as source and target artifacts or as intermediate artifacts.</a:t>
+            </a:r>
+          </a:p>
+          <a:p>
+            <a:r>
+              <a:rPr lang="en-GB" noProof="0" dirty="0"/>
+              <a:t>Lastly, we think it would be interesting to </a:t>
+            </a:r>
+            <a:r>
+              <a:rPr lang="en-GB" b="1" noProof="0" dirty="0"/>
+              <a:t>combine our approaches </a:t>
+            </a:r>
+            <a:r>
+              <a:rPr lang="en-GB" noProof="0" dirty="0"/>
+              <a:t>with other approaches to improve performance or support other kinds of artifacts.</a:t>
             </a:r>
           </a:p>
           <a:p>
@@ -3137,28 +3286,15 @@
           <a:p>
             <a:r>
               <a:rPr lang="en-GB" noProof="0" dirty="0"/>
-              <a:t>In future work, we want to further evaluate the approach on more different projects.</a:t>
-            </a:r>
-          </a:p>
-          <a:p>
+              <a:t>Following the </a:t>
+            </a:r>
+            <a:r>
+              <a:rPr lang="en-GB" b="1" noProof="0" dirty="0"/>
+              <a:t>link or the QR-code </a:t>
+            </a:r>
             <a:r>
               <a:rPr lang="en-GB" noProof="0" dirty="0"/>
-              <a:t>We also plan to experiment with other kinds of artifacts, either as source and target artifacts or as intermediate artifacts.</a:t>
-            </a:r>
-          </a:p>
-          <a:p>
-            <a:r>
-              <a:rPr lang="en-GB" noProof="0" dirty="0"/>
-              <a:t>Lastly, we think it would be interesting to combine our approaches with other approaches to improve performance or support other kinds of artifacts.</a:t>
-            </a:r>
-          </a:p>
-          <a:p>
-            <a:endParaRPr lang="en-GB" noProof="0" dirty="0"/>
-          </a:p>
-          <a:p>
-            <a:r>
-              <a:rPr lang="en-GB" noProof="0" dirty="0"/>
-              <a:t>Following the link or the QR-code on the right, you can find our paper, our replication package as well as these slides. </a:t>
+              <a:t>on the right, you can find our paper, our replication package as well as these slides. </a:t>
             </a:r>
           </a:p>
           <a:p>
@@ -3180,8 +3316,12 @@
               <a:defRPr/>
             </a:pPr>
             <a:r>
+              <a:rPr lang="en-GB" b="1" noProof="0" dirty="0"/>
+              <a:t>This was my presentation</a:t>
+            </a:r>
+            <a:r>
               <a:rPr lang="en-GB" noProof="0" dirty="0"/>
-              <a:t>This was my presentation, thank you All for your attention and I am excited to discuss our work with you!</a:t>
+              <a:t>, thank you All for your attention and I am excited to discuss our work with you!</a:t>
             </a:r>
           </a:p>
         </p:txBody>
@@ -3589,39 +3729,39 @@
           <a:lstStyle/>
           <a:p>
             <a:r>
-              <a:rPr lang="de-DE" dirty="0" err="1"/>
+              <a:rPr lang="de-DE" b="1" dirty="0" err="1"/>
               <a:t>To</a:t>
             </a:r>
             <a:r>
-              <a:rPr lang="de-DE" dirty="0"/>
+              <a:rPr lang="de-DE" b="1" dirty="0"/>
               <a:t> </a:t>
             </a:r>
             <a:r>
-              <a:rPr lang="de-DE" dirty="0" err="1"/>
+              <a:rPr lang="de-DE" b="1" dirty="0" err="1"/>
               <a:t>get</a:t>
             </a:r>
             <a:r>
-              <a:rPr lang="de-DE" dirty="0"/>
+              <a:rPr lang="de-DE" b="1" dirty="0"/>
               <a:t> </a:t>
             </a:r>
             <a:r>
-              <a:rPr lang="de-DE" dirty="0" err="1"/>
+              <a:rPr lang="de-DE" b="1" dirty="0" err="1"/>
               <a:t>into</a:t>
             </a:r>
             <a:r>
-              <a:rPr lang="de-DE" dirty="0"/>
+              <a:rPr lang="de-DE" b="1" dirty="0"/>
               <a:t> </a:t>
             </a:r>
             <a:r>
-              <a:rPr lang="de-DE" dirty="0" err="1"/>
+              <a:rPr lang="de-DE" b="1" dirty="0" err="1"/>
               <a:t>the</a:t>
             </a:r>
             <a:r>
-              <a:rPr lang="de-DE" dirty="0"/>
+              <a:rPr lang="de-DE" b="1" dirty="0"/>
               <a:t> </a:t>
             </a:r>
             <a:r>
-              <a:rPr lang="de-DE" dirty="0" err="1"/>
+              <a:rPr lang="de-DE" b="1" dirty="0" err="1"/>
               <a:t>topic</a:t>
             </a:r>
             <a:r>
@@ -3669,20 +3809,24 @@
               <a:t> </a:t>
             </a:r>
             <a:r>
-              <a:rPr lang="de-DE" dirty="0" err="1"/>
+              <a:rPr lang="de-DE" b="1" dirty="0" err="1"/>
               <a:t>developing</a:t>
             </a:r>
             <a:r>
-              <a:rPr lang="de-DE" dirty="0"/>
+              <a:rPr lang="de-DE" b="1" dirty="0"/>
               <a:t> </a:t>
             </a:r>
             <a:r>
-              <a:rPr lang="de-DE" dirty="0" err="1"/>
+              <a:rPr lang="de-DE" b="1" dirty="0" err="1"/>
               <a:t>process</a:t>
             </a:r>
             <a:r>
-              <a:rPr lang="de-DE" dirty="0"/>
-              <a:t> and </a:t>
+              <a:rPr lang="de-DE" b="1" dirty="0"/>
+              <a:t> </a:t>
+            </a:r>
+            <a:r>
+              <a:rPr lang="de-DE" dirty="0"/>
+              <a:t>and </a:t>
             </a:r>
             <a:r>
               <a:rPr lang="de-DE" dirty="0" err="1"/>
@@ -3709,35 +3853,35 @@
               <a:t> </a:t>
             </a:r>
             <a:r>
-              <a:rPr lang="de-DE" dirty="0" err="1"/>
+              <a:rPr lang="de-DE" b="1" dirty="0" err="1"/>
               <a:t>artifacts</a:t>
             </a:r>
             <a:r>
-              <a:rPr lang="de-DE" dirty="0"/>
+              <a:rPr lang="de-DE" b="1" dirty="0"/>
               <a:t> </a:t>
             </a:r>
             <a:r>
-              <a:rPr lang="de-DE" dirty="0" err="1"/>
+              <a:rPr lang="de-DE" b="1" dirty="0" err="1"/>
               <a:t>that</a:t>
             </a:r>
             <a:r>
-              <a:rPr lang="de-DE" dirty="0"/>
+              <a:rPr lang="de-DE" b="1" dirty="0"/>
               <a:t> </a:t>
             </a:r>
             <a:r>
-              <a:rPr lang="de-DE" dirty="0" err="1"/>
+              <a:rPr lang="de-DE" b="1" dirty="0" err="1"/>
               <a:t>we</a:t>
             </a:r>
             <a:r>
-              <a:rPr lang="de-DE" dirty="0"/>
+              <a:rPr lang="de-DE" b="1" dirty="0"/>
               <a:t> </a:t>
             </a:r>
             <a:r>
-              <a:rPr lang="de-DE" dirty="0" err="1"/>
+              <a:rPr lang="de-DE" b="1" dirty="0" err="1"/>
               <a:t>produce</a:t>
             </a:r>
             <a:r>
-              <a:rPr lang="de-DE" dirty="0"/>
+              <a:rPr lang="de-DE" b="1" dirty="0"/>
               <a:t> </a:t>
             </a:r>
             <a:r>
@@ -3777,15 +3921,15 @@
             </a:pPr>
             <a:r>
               <a:rPr lang="en-GB" noProof="0" dirty="0"/>
-              <a:t>When developing software, we create different artifacts and especially different </a:t>
+              <a:t>When developing software, we create </a:t>
             </a:r>
             <a:r>
               <a:rPr lang="en-GB" b="1" noProof="0" dirty="0"/>
-              <a:t>kinds</a:t>
+              <a:t>different artifacts and especially different kinds </a:t>
             </a:r>
             <a:r>
               <a:rPr lang="en-GB" noProof="0" dirty="0"/>
-              <a:t> of artifacts.</a:t>
+              <a:t>of artifacts.</a:t>
             </a:r>
           </a:p>
           <a:p>
@@ -3808,7 +3952,55 @@
             </a:pPr>
             <a:r>
               <a:rPr lang="en-GB" noProof="0" dirty="0"/>
-              <a:t>These include requirement documents, design documents like UML class diagrams, software architecture documents and architecture diagrams, issues and obviously code.</a:t>
+              <a:t>These include </a:t>
+            </a:r>
+            <a:r>
+              <a:rPr lang="en-GB" b="1" noProof="0" dirty="0"/>
+              <a:t>requirement documents</a:t>
+            </a:r>
+            <a:r>
+              <a:rPr lang="en-GB" noProof="0" dirty="0"/>
+              <a:t>, design documents like </a:t>
+            </a:r>
+            <a:r>
+              <a:rPr lang="en-GB" b="1" noProof="0" dirty="0"/>
+              <a:t>UML class diagrams</a:t>
+            </a:r>
+            <a:r>
+              <a:rPr lang="en-GB" noProof="0" dirty="0"/>
+              <a:t>, </a:t>
+            </a:r>
+            <a:r>
+              <a:rPr lang="en-GB" b="1" noProof="0" dirty="0"/>
+              <a:t>software architecture documents </a:t>
+            </a:r>
+            <a:r>
+              <a:rPr lang="en-GB" noProof="0" dirty="0"/>
+              <a:t>and </a:t>
+            </a:r>
+            <a:r>
+              <a:rPr lang="en-GB" b="1" noProof="0" dirty="0"/>
+              <a:t>architecture diagrams</a:t>
+            </a:r>
+            <a:r>
+              <a:rPr lang="en-GB" noProof="0" dirty="0"/>
+              <a:t>, </a:t>
+            </a:r>
+            <a:r>
+              <a:rPr lang="en-GB" b="1" noProof="0" dirty="0"/>
+              <a:t>issues</a:t>
+            </a:r>
+            <a:r>
+              <a:rPr lang="en-GB" noProof="0" dirty="0"/>
+              <a:t> and obviously </a:t>
+            </a:r>
+            <a:r>
+              <a:rPr lang="en-GB" b="1" noProof="0" dirty="0"/>
+              <a:t>code</a:t>
+            </a:r>
+            <a:r>
+              <a:rPr lang="en-GB" noProof="0" dirty="0"/>
+              <a:t>.</a:t>
             </a:r>
           </a:p>
           <a:p>
@@ -3831,19 +4023,91 @@
             </a:pPr>
             <a:r>
               <a:rPr lang="en-GB" noProof="0" dirty="0"/>
-              <a:t>Between pairs of different kinds of artifacts, there can be shared information like the existence of certain entities but also some explicit information that is special to a specific kind of artifact.</a:t>
-            </a:r>
-          </a:p>
-          <a:p>
+              <a:t>Between pairs of different kinds of artifacts, there can be </a:t>
+            </a:r>
+            <a:r>
+              <a:rPr lang="en-GB" b="1" noProof="0" dirty="0"/>
+              <a:t>shared information </a:t>
+            </a:r>
             <a:r>
               <a:rPr lang="en-GB" noProof="0" dirty="0"/>
-              <a:t>For example, code contains entities along with execution semantics as well as low-level documentation. </a:t>
-            </a:r>
-          </a:p>
-          <a:p>
+              <a:t>like the </a:t>
+            </a:r>
+            <a:r>
+              <a:rPr lang="en-GB" b="1" noProof="0" dirty="0"/>
+              <a:t>existence of certain entities</a:t>
+            </a:r>
             <a:r>
               <a:rPr lang="en-GB" noProof="0" dirty="0"/>
-              <a:t>In software architecture documentation, we can have design decisions about the entities but also about reasoning or architectural guidelines and patterns.</a:t>
+              <a:t> but also some explicit information that is </a:t>
+            </a:r>
+            <a:r>
+              <a:rPr lang="en-GB" b="1" noProof="0" dirty="0"/>
+              <a:t>special to a specific kind </a:t>
+            </a:r>
+            <a:r>
+              <a:rPr lang="en-GB" noProof="0" dirty="0"/>
+              <a:t>of artifact.</a:t>
+            </a:r>
+          </a:p>
+          <a:p>
+            <a:r>
+              <a:rPr lang="en-GB" noProof="0" dirty="0"/>
+              <a:t>For example, </a:t>
+            </a:r>
+            <a:r>
+              <a:rPr lang="en-GB" b="1" noProof="0" dirty="0"/>
+              <a:t>code</a:t>
+            </a:r>
+            <a:r>
+              <a:rPr lang="en-GB" noProof="0" dirty="0"/>
+              <a:t> contains entities along with </a:t>
+            </a:r>
+            <a:r>
+              <a:rPr lang="en-GB" b="1" noProof="0" dirty="0"/>
+              <a:t>execution semantics </a:t>
+            </a:r>
+            <a:r>
+              <a:rPr lang="en-GB" noProof="0" dirty="0"/>
+              <a:t>as well as </a:t>
+            </a:r>
+            <a:r>
+              <a:rPr lang="en-GB" b="1" noProof="0" dirty="0"/>
+              <a:t>low-level documentation</a:t>
+            </a:r>
+            <a:r>
+              <a:rPr lang="en-GB" noProof="0" dirty="0"/>
+              <a:t>. </a:t>
+            </a:r>
+          </a:p>
+          <a:p>
+            <a:r>
+              <a:rPr lang="en-GB" noProof="0" dirty="0"/>
+              <a:t>In software </a:t>
+            </a:r>
+            <a:r>
+              <a:rPr lang="en-GB" b="1" noProof="0" dirty="0"/>
+              <a:t>architecture documentation</a:t>
+            </a:r>
+            <a:r>
+              <a:rPr lang="en-GB" noProof="0" dirty="0"/>
+              <a:t>, we have </a:t>
+            </a:r>
+            <a:r>
+              <a:rPr lang="en-GB" b="1" noProof="0" dirty="0"/>
+              <a:t>design decisions </a:t>
+            </a:r>
+            <a:r>
+              <a:rPr lang="en-GB" noProof="0" dirty="0"/>
+              <a:t>about the entities and also about </a:t>
+            </a:r>
+            <a:r>
+              <a:rPr lang="en-GB" b="1" noProof="0" dirty="0"/>
+              <a:t>reasoning</a:t>
+            </a:r>
+            <a:r>
+              <a:rPr lang="en-GB" noProof="0" dirty="0"/>
+              <a:t> or architectural guidelines and patterns.</a:t>
             </a:r>
           </a:p>
           <a:p>
@@ -3852,8 +4116,12 @@
               <a:t>(*click*) </a:t>
             </a:r>
             <a:r>
+              <a:rPr lang="en-GB" b="1" noProof="0" dirty="0"/>
+              <a:t>Trace links make explicit</a:t>
+            </a:r>
+            <a:r>
               <a:rPr lang="en-GB" noProof="0" dirty="0"/>
-              <a:t>Trace links make explicit, which entities in the different artifacts are related and where the artifacts exactly contain shared as well as artifact-specific information about a certain entity.</a:t>
+              <a:t>, which entities in the different artifacts are related and where the artifacts exactly contain shared as well as artifact-specific information about a certain entity.</a:t>
             </a:r>
           </a:p>
           <a:p>
@@ -3914,7 +4182,15 @@
           <a:p>
             <a:r>
               <a:rPr lang="en-GB" noProof="0" dirty="0"/>
-              <a:t>To easily share and use this knowledge, we want to explicitly document trace links.</a:t>
+              <a:t>To easily share and use this knowledge, </a:t>
+            </a:r>
+            <a:r>
+              <a:rPr lang="en-GB" b="1" noProof="0" dirty="0"/>
+              <a:t>we want to explicitly document trace links</a:t>
+            </a:r>
+            <a:r>
+              <a:rPr lang="en-GB" noProof="0" dirty="0"/>
+              <a:t>.</a:t>
             </a:r>
           </a:p>
         </p:txBody>
@@ -4013,13 +4289,37 @@
           <a:p>
             <a:r>
               <a:rPr lang="en-GB" noProof="0" dirty="0"/>
-              <a:t>Most of us have probably produced some code for a software system; just like the code on the right.</a:t>
-            </a:r>
-          </a:p>
-          <a:p>
+              <a:t>Most of us have </a:t>
+            </a:r>
+            <a:r>
+              <a:rPr lang="en-GB" b="1" noProof="0" dirty="0"/>
+              <a:t>probably produced some code </a:t>
+            </a:r>
             <a:r>
               <a:rPr lang="en-GB" noProof="0" dirty="0"/>
-              <a:t>(*click*) Maybe some of you even created documentation like this software architecture documentation on the left, although probably reluctantly.</a:t>
+              <a:t>for a software system; just like the code on the right.</a:t>
+            </a:r>
+          </a:p>
+          <a:p>
+            <a:r>
+              <a:rPr lang="en-GB" noProof="0" dirty="0"/>
+              <a:t>(*click*) Maybe </a:t>
+            </a:r>
+            <a:r>
+              <a:rPr lang="en-GB" b="1" noProof="0" dirty="0"/>
+              <a:t>some of you even created documentation </a:t>
+            </a:r>
+            <a:r>
+              <a:rPr lang="en-GB" noProof="0" dirty="0"/>
+              <a:t>like this software architecture documentation on the left, although </a:t>
+            </a:r>
+            <a:r>
+              <a:rPr lang="en-GB" b="1" noProof="0" dirty="0"/>
+              <a:t>probably reluctantly</a:t>
+            </a:r>
+            <a:r>
+              <a:rPr lang="en-GB" noProof="0" dirty="0"/>
+              <a:t>.</a:t>
             </a:r>
           </a:p>
           <a:p>
@@ -4065,7 +4365,15 @@
             </a:pPr>
             <a:r>
               <a:rPr lang="en-GB" noProof="0" dirty="0"/>
-              <a:t>While in some cases it is easy to spot the relation between artifacts, like here the „controller“(*click*) highlighted in green, it is hard in many other cases to directly identify which parts should be linked.</a:t>
+              <a:t>While in </a:t>
+            </a:r>
+            <a:r>
+              <a:rPr lang="en-GB" b="1" noProof="0" dirty="0"/>
+              <a:t>some cases it is easy </a:t>
+            </a:r>
+            <a:r>
+              <a:rPr lang="en-GB" noProof="0" dirty="0"/>
+              <a:t>to spot the relation between artifacts, like here the „controller“(*click*) highlighted in green, it is hard in many other cases to directly identify which parts should be linked.</a:t>
             </a:r>
           </a:p>
           <a:p>
@@ -4153,8 +4461,12 @@
               <a:defRPr/>
             </a:pPr>
             <a:r>
+              <a:rPr lang="en-GB" b="1" noProof="0" dirty="0"/>
+              <a:t>Manually creating these links is time-consuming and error-prone</a:t>
+            </a:r>
+            <a:r>
               <a:rPr lang="en-GB" noProof="0" dirty="0"/>
-              <a:t>Manually creating these links is time-consuming and error-prone, this is why there are already some approaches for automated traceability link recovery</a:t>
+              <a:t>, this is why there are already some approaches for automated traceability link recovery</a:t>
             </a:r>
             <a:r>
               <a:rPr lang="de-DE" dirty="0"/>
@@ -4185,7 +4497,15 @@
             </a:pPr>
             <a:r>
               <a:rPr lang="en-GB" noProof="0" dirty="0"/>
-              <a:t>The challenge for these automated approaches is the semantic gap between artifacts.</a:t>
+              <a:t>The challenge for these automated approaches is the </a:t>
+            </a:r>
+            <a:r>
+              <a:rPr lang="en-GB" b="1" noProof="0" dirty="0"/>
+              <a:t>semantic gap between artifacts</a:t>
+            </a:r>
+            <a:r>
+              <a:rPr lang="en-GB" noProof="0" dirty="0"/>
+              <a:t>.</a:t>
             </a:r>
           </a:p>
           <a:p>
@@ -4298,7 +4618,11 @@
           <a:p>
             <a:r>
               <a:rPr lang="en-GB" noProof="0" dirty="0"/>
-              <a:t>To properly recover trace link, approaches need to bridge the semantic gap between artifacts </a:t>
+              <a:t>To properly recover trace link, approaches </a:t>
+            </a:r>
+            <a:r>
+              <a:rPr lang="en-GB" b="1" noProof="0" dirty="0"/>
+              <a:t>need to bridge the semantic gap </a:t>
             </a:r>
             <a:r>
               <a:rPr lang="de-DE" dirty="0"/>
@@ -4320,7 +4644,15 @@
           <a:p>
             <a:r>
               <a:rPr lang="en-GB" noProof="0" dirty="0"/>
-              <a:t>There are different approaches and techniques that are used to try to bridge the gap.</a:t>
+              <a:t>There are </a:t>
+            </a:r>
+            <a:r>
+              <a:rPr lang="en-GB" b="1" noProof="0" dirty="0"/>
+              <a:t>different approaches and techniques </a:t>
+            </a:r>
+            <a:r>
+              <a:rPr lang="en-GB" noProof="0" dirty="0"/>
+              <a:t>that are used to try to bridge the gap.</a:t>
             </a:r>
           </a:p>
           <a:p>
@@ -4475,7 +4807,15 @@
             </a:r>
             <a:r>
               <a:rPr lang="en-GB" noProof="0" dirty="0"/>
-              <a:t>) While these all are valid options, these approaches have problems with larger semantic gaps and regularly fail to adequately recover trace links.</a:t>
+              <a:t>) While these all are valid options, these approaches have </a:t>
+            </a:r>
+            <a:r>
+              <a:rPr lang="en-GB" b="1" noProof="0" dirty="0"/>
+              <a:t>problems with larger semantic gaps and regularly fail </a:t>
+            </a:r>
+            <a:r>
+              <a:rPr lang="en-GB" noProof="0" dirty="0"/>
+              <a:t>to adequately recover trace links.</a:t>
             </a:r>
           </a:p>
           <a:p>
@@ -4498,7 +4838,15 @@
             </a:pPr>
             <a:r>
               <a:rPr lang="en-GB" noProof="0" dirty="0"/>
-              <a:t>In our opinion, one way to tackle this problem with the semantic gap is to reduce the gap by using intermediate artifacts.</a:t>
+              <a:t>In our opinion, one way to tackle this problem with the semantic gap is to reduce the gap by using </a:t>
+            </a:r>
+            <a:r>
+              <a:rPr lang="en-GB" b="1" noProof="0" dirty="0"/>
+              <a:t>intermediate artifacts</a:t>
+            </a:r>
+            <a:r>
+              <a:rPr lang="en-GB" noProof="0" dirty="0"/>
+              <a:t>.</a:t>
             </a:r>
           </a:p>
           <a:p>
@@ -4649,58 +4997,62 @@
             </a:r>
             <a:r>
               <a:rPr lang="de-DE" dirty="0"/>
-              <a:t> do not </a:t>
-            </a:r>
-            <a:r>
-              <a:rPr lang="de-DE" dirty="0" err="1"/>
+              <a:t> do </a:t>
+            </a:r>
+            <a:r>
+              <a:rPr lang="de-DE" b="1" dirty="0"/>
+              <a:t>not </a:t>
+            </a:r>
+            <a:r>
+              <a:rPr lang="de-DE" b="1" dirty="0" err="1"/>
               <a:t>have</a:t>
             </a:r>
             <a:r>
-              <a:rPr lang="de-DE" dirty="0"/>
+              <a:rPr lang="de-DE" b="1" dirty="0"/>
               <a:t> </a:t>
             </a:r>
             <a:r>
-              <a:rPr lang="de-DE" dirty="0" err="1"/>
+              <a:rPr lang="de-DE" b="1" dirty="0" err="1"/>
               <a:t>one</a:t>
             </a:r>
             <a:r>
-              <a:rPr lang="de-DE" dirty="0"/>
+              <a:rPr lang="de-DE" b="1" dirty="0"/>
               <a:t> </a:t>
             </a:r>
             <a:r>
-              <a:rPr lang="de-DE" dirty="0" err="1"/>
+              <a:rPr lang="de-DE" b="1" dirty="0" err="1"/>
               <a:t>big</a:t>
             </a:r>
             <a:r>
-              <a:rPr lang="de-DE" dirty="0"/>
+              <a:rPr lang="de-DE" b="1" dirty="0"/>
               <a:t> </a:t>
             </a:r>
             <a:r>
-              <a:rPr lang="de-DE" dirty="0" err="1"/>
+              <a:rPr lang="de-DE" b="1" dirty="0" err="1"/>
               <a:t>gap</a:t>
             </a:r>
             <a:r>
-              <a:rPr lang="de-DE" dirty="0"/>
+              <a:rPr lang="de-DE" b="1" dirty="0"/>
               <a:t> but </a:t>
             </a:r>
             <a:r>
-              <a:rPr lang="de-DE" dirty="0" err="1"/>
+              <a:rPr lang="de-DE" b="1" dirty="0" err="1"/>
               <a:t>two</a:t>
             </a:r>
             <a:r>
-              <a:rPr lang="de-DE" dirty="0"/>
+              <a:rPr lang="de-DE" b="1" dirty="0"/>
               <a:t> </a:t>
             </a:r>
             <a:r>
-              <a:rPr lang="de-DE" dirty="0" err="1"/>
+              <a:rPr lang="de-DE" b="1" dirty="0" err="1"/>
               <a:t>smaller</a:t>
             </a:r>
             <a:r>
-              <a:rPr lang="de-DE" dirty="0"/>
+              <a:rPr lang="de-DE" b="1" dirty="0"/>
               <a:t> </a:t>
             </a:r>
             <a:r>
-              <a:rPr lang="de-DE" dirty="0" err="1"/>
+              <a:rPr lang="de-DE" b="1" dirty="0" err="1"/>
               <a:t>gaps</a:t>
             </a:r>
             <a:r>
@@ -4727,19 +5079,19 @@
               <a:defRPr/>
             </a:pPr>
             <a:r>
-              <a:rPr lang="de-DE" dirty="0"/>
+              <a:rPr lang="de-DE" b="1" dirty="0"/>
               <a:t>In </a:t>
             </a:r>
             <a:r>
-              <a:rPr lang="de-DE" dirty="0" err="1"/>
+              <a:rPr lang="de-DE" b="1" dirty="0" err="1"/>
               <a:t>our</a:t>
             </a:r>
             <a:r>
-              <a:rPr lang="de-DE" dirty="0"/>
+              <a:rPr lang="de-DE" b="1" dirty="0"/>
               <a:t> </a:t>
             </a:r>
             <a:r>
-              <a:rPr lang="de-DE" dirty="0" err="1"/>
+              <a:rPr lang="de-DE" b="1" dirty="0" err="1"/>
               <a:t>case</a:t>
             </a:r>
             <a:r>
@@ -4913,35 +5265,35 @@
               <a:t> </a:t>
             </a:r>
             <a:r>
-              <a:rPr lang="de-DE" dirty="0" err="1"/>
+              <a:rPr lang="de-DE" b="1" dirty="0" err="1"/>
               <a:t>are</a:t>
             </a:r>
             <a:r>
-              <a:rPr lang="de-DE" dirty="0"/>
+              <a:rPr lang="de-DE" b="1" dirty="0"/>
               <a:t> </a:t>
             </a:r>
             <a:r>
-              <a:rPr lang="de-DE" dirty="0" err="1"/>
+              <a:rPr lang="de-DE" b="1" dirty="0" err="1"/>
               <a:t>semantically</a:t>
             </a:r>
             <a:r>
-              <a:rPr lang="de-DE" dirty="0"/>
+              <a:rPr lang="de-DE" b="1" dirty="0"/>
               <a:t> </a:t>
             </a:r>
             <a:r>
-              <a:rPr lang="de-DE" dirty="0" err="1"/>
+              <a:rPr lang="de-DE" b="1" dirty="0" err="1"/>
               <a:t>somewhat</a:t>
             </a:r>
             <a:r>
-              <a:rPr lang="de-DE" dirty="0"/>
+              <a:rPr lang="de-DE" b="1" dirty="0"/>
               <a:t> in-</a:t>
             </a:r>
             <a:r>
-              <a:rPr lang="de-DE" dirty="0" err="1"/>
+              <a:rPr lang="de-DE" b="1" dirty="0" err="1"/>
               <a:t>between</a:t>
             </a:r>
             <a:r>
-              <a:rPr lang="de-DE" dirty="0"/>
+              <a:rPr lang="de-DE" b="1" dirty="0"/>
               <a:t> </a:t>
             </a:r>
             <a:r>
@@ -5358,27 +5710,27 @@
               <a:t> </a:t>
             </a:r>
             <a:r>
-              <a:rPr lang="de-DE" dirty="0" err="1"/>
+              <a:rPr lang="de-DE" b="1" dirty="0" err="1"/>
               <a:t>existing</a:t>
             </a:r>
             <a:r>
-              <a:rPr lang="de-DE" dirty="0"/>
+              <a:rPr lang="de-DE" b="1" dirty="0"/>
               <a:t> </a:t>
             </a:r>
             <a:r>
-              <a:rPr lang="de-DE" dirty="0" err="1"/>
+              <a:rPr lang="de-DE" b="1" dirty="0" err="1"/>
               <a:t>approach</a:t>
             </a:r>
             <a:r>
-              <a:rPr lang="de-DE" dirty="0"/>
+              <a:rPr lang="de-DE" b="1" dirty="0"/>
               <a:t> </a:t>
             </a:r>
             <a:r>
-              <a:rPr lang="de-DE" dirty="0" err="1"/>
+              <a:rPr lang="de-DE" b="1" dirty="0" err="1"/>
               <a:t>ArDoCo</a:t>
             </a:r>
             <a:r>
-              <a:rPr lang="de-DE" dirty="0"/>
+              <a:rPr lang="de-DE" b="1" dirty="0"/>
               <a:t> </a:t>
             </a:r>
             <a:r>
@@ -5521,66 +5873,62 @@
               <a:t> </a:t>
             </a:r>
             <a:r>
-              <a:rPr lang="de-DE" dirty="0" err="1"/>
+              <a:rPr lang="de-DE" b="1" dirty="0" err="1"/>
               <a:t>our</a:t>
             </a:r>
             <a:r>
-              <a:rPr lang="de-DE" dirty="0"/>
+              <a:rPr lang="de-DE" b="1" dirty="0"/>
               <a:t> </a:t>
             </a:r>
             <a:r>
-              <a:rPr lang="de-DE" dirty="0" err="1"/>
+              <a:rPr lang="de-DE" b="1" dirty="0" err="1"/>
               <a:t>new</a:t>
             </a:r>
             <a:r>
-              <a:rPr lang="de-DE" dirty="0"/>
+              <a:rPr lang="de-DE" b="1" dirty="0"/>
               <a:t> </a:t>
             </a:r>
             <a:r>
-              <a:rPr lang="de-DE" sz="900" b="0" dirty="0" err="1"/>
+              <a:rPr lang="de-DE" sz="900" b="1" dirty="0" err="1"/>
               <a:t>ARchitecture</a:t>
             </a:r>
             <a:r>
-              <a:rPr lang="de-DE" sz="900" b="0" dirty="0"/>
+              <a:rPr lang="de-DE" sz="900" b="1" dirty="0"/>
               <a:t> </a:t>
             </a:r>
             <a:r>
-              <a:rPr lang="de-DE" sz="900" b="0" dirty="0" err="1"/>
+              <a:rPr lang="de-DE" sz="900" b="1" dirty="0" err="1"/>
               <a:t>to</a:t>
             </a:r>
             <a:r>
-              <a:rPr lang="de-DE" sz="900" b="0" dirty="0"/>
+              <a:rPr lang="de-DE" sz="900" b="1" dirty="0"/>
               <a:t> </a:t>
             </a:r>
             <a:r>
-              <a:rPr lang="de-DE" sz="900" b="0" dirty="0" err="1"/>
+              <a:rPr lang="de-DE" sz="900" b="1" dirty="0" err="1"/>
               <a:t>COde</a:t>
             </a:r>
             <a:r>
-              <a:rPr lang="de-DE" sz="900" b="0" dirty="0"/>
-              <a:t> Trace Linking</a:t>
+              <a:rPr lang="de-DE" sz="900" b="1" dirty="0"/>
+              <a:t> Trace Linking, </a:t>
+            </a:r>
+            <a:r>
+              <a:rPr lang="de-DE" sz="900" b="1" dirty="0" err="1"/>
+              <a:t>short</a:t>
+            </a:r>
+            <a:r>
+              <a:rPr lang="de-DE" sz="900" b="1" dirty="0"/>
+              <a:t> </a:t>
+            </a:r>
+            <a:r>
+              <a:rPr lang="de-DE" sz="900" b="1" dirty="0" err="1"/>
+              <a:t>ArCoTL</a:t>
             </a:r>
             <a:r>
               <a:rPr lang="de-DE" sz="900" dirty="0"/>
               <a:t>, </a:t>
             </a:r>
             <a:r>
-              <a:rPr lang="de-DE" sz="900" dirty="0" err="1"/>
-              <a:t>short</a:t>
-            </a:r>
-            <a:r>
-              <a:rPr lang="de-DE" sz="900" dirty="0"/>
-              <a:t> </a:t>
-            </a:r>
-            <a:r>
-              <a:rPr lang="de-DE" sz="900" dirty="0" err="1"/>
-              <a:t>ArCoTL</a:t>
-            </a:r>
-            <a:r>
-              <a:rPr lang="de-DE" sz="900" dirty="0"/>
-              <a:t>, </a:t>
-            </a:r>
-            <a:r>
               <a:rPr lang="de-DE" dirty="0" err="1"/>
               <a:t>to</a:t>
             </a:r>
@@ -5715,27 +6063,27 @@
               <a:t> </a:t>
             </a:r>
             <a:r>
-              <a:rPr lang="de-DE" dirty="0" err="1"/>
+              <a:rPr lang="de-DE" b="1" dirty="0" err="1"/>
               <a:t>can</a:t>
             </a:r>
             <a:r>
-              <a:rPr lang="de-DE" dirty="0"/>
+              <a:rPr lang="de-DE" b="1" dirty="0"/>
               <a:t> </a:t>
             </a:r>
             <a:r>
-              <a:rPr lang="de-DE" dirty="0" err="1"/>
+              <a:rPr lang="de-DE" b="1" dirty="0" err="1"/>
               <a:t>transitively</a:t>
             </a:r>
             <a:r>
-              <a:rPr lang="de-DE" dirty="0"/>
+              <a:rPr lang="de-DE" b="1" dirty="0"/>
               <a:t> </a:t>
             </a:r>
             <a:r>
-              <a:rPr lang="de-DE" dirty="0" err="1"/>
+              <a:rPr lang="de-DE" b="1" dirty="0" err="1"/>
               <a:t>combine</a:t>
             </a:r>
             <a:r>
-              <a:rPr lang="de-DE" dirty="0"/>
+              <a:rPr lang="de-DE" b="1" dirty="0"/>
               <a:t> </a:t>
             </a:r>
             <a:r>
@@ -5795,23 +6143,23 @@
               <a:t> </a:t>
             </a:r>
             <a:r>
-              <a:rPr lang="de-DE" dirty="0" err="1"/>
+              <a:rPr lang="de-DE" b="1" dirty="0" err="1"/>
               <a:t>our</a:t>
             </a:r>
             <a:r>
-              <a:rPr lang="de-DE" dirty="0"/>
+              <a:rPr lang="de-DE" b="1" dirty="0"/>
               <a:t> transitive </a:t>
             </a:r>
             <a:r>
-              <a:rPr lang="de-DE" dirty="0" err="1"/>
+              <a:rPr lang="de-DE" b="1" dirty="0" err="1"/>
               <a:t>approach</a:t>
             </a:r>
             <a:r>
-              <a:rPr lang="de-DE" dirty="0"/>
+              <a:rPr lang="de-DE" b="1" dirty="0"/>
               <a:t> </a:t>
             </a:r>
             <a:r>
-              <a:rPr lang="de-DE" dirty="0" err="1"/>
+              <a:rPr lang="de-DE" b="1" dirty="0" err="1"/>
               <a:t>TransArC</a:t>
             </a:r>
             <a:r>
@@ -5873,31 +6221,31 @@
               <a:t> </a:t>
             </a:r>
             <a:r>
-              <a:rPr lang="de-DE" dirty="0" err="1"/>
+              <a:rPr lang="de-DE" b="1" dirty="0" err="1"/>
               <a:t>three</a:t>
             </a:r>
             <a:r>
-              <a:rPr lang="de-DE" dirty="0"/>
+              <a:rPr lang="de-DE" b="1" dirty="0"/>
               <a:t> </a:t>
             </a:r>
             <a:r>
-              <a:rPr lang="de-DE" dirty="0" err="1"/>
+              <a:rPr lang="de-DE" b="1" dirty="0" err="1"/>
               <a:t>main</a:t>
             </a:r>
             <a:r>
-              <a:rPr lang="de-DE" dirty="0"/>
+              <a:rPr lang="de-DE" b="1" dirty="0"/>
               <a:t> </a:t>
             </a:r>
             <a:r>
-              <a:rPr lang="de-DE" dirty="0" err="1"/>
+              <a:rPr lang="de-DE" b="1" dirty="0" err="1"/>
               <a:t>research</a:t>
             </a:r>
             <a:r>
-              <a:rPr lang="de-DE" dirty="0"/>
+              <a:rPr lang="de-DE" b="1" dirty="0"/>
               <a:t> </a:t>
             </a:r>
             <a:r>
-              <a:rPr lang="de-DE" dirty="0" err="1"/>
+              <a:rPr lang="de-DE" b="1" dirty="0" err="1"/>
               <a:t>questions</a:t>
             </a:r>
             <a:r>
@@ -6582,7 +6930,7 @@
               <a:t> </a:t>
             </a:r>
             <a:r>
-              <a:rPr lang="de-DE" dirty="0" err="1"/>
+              <a:rPr lang="de-DE" b="1" dirty="0" err="1"/>
               <a:t>ArDoCo</a:t>
             </a:r>
             <a:r>
@@ -6722,55 +7070,55 @@
               <a:t> </a:t>
             </a:r>
             <a:r>
-              <a:rPr lang="de-DE" dirty="0" err="1"/>
+              <a:rPr lang="de-DE" b="1" dirty="0" err="1"/>
               <a:t>identifies</a:t>
             </a:r>
             <a:r>
-              <a:rPr lang="de-DE" dirty="0"/>
+              <a:rPr lang="de-DE" b="1" dirty="0"/>
               <a:t> </a:t>
             </a:r>
             <a:r>
-              <a:rPr lang="de-DE" dirty="0" err="1"/>
+              <a:rPr lang="de-DE" b="1" dirty="0" err="1"/>
               <a:t>architectural</a:t>
             </a:r>
             <a:r>
-              <a:rPr lang="de-DE" dirty="0"/>
+              <a:rPr lang="de-DE" b="1" dirty="0"/>
               <a:t> relevant </a:t>
             </a:r>
             <a:r>
-              <a:rPr lang="de-DE" dirty="0" err="1"/>
+              <a:rPr lang="de-DE" b="1" dirty="0" err="1"/>
               <a:t>entities</a:t>
             </a:r>
             <a:r>
-              <a:rPr lang="de-DE" dirty="0"/>
+              <a:rPr lang="de-DE" b="1" dirty="0"/>
               <a:t> in </a:t>
             </a:r>
             <a:r>
-              <a:rPr lang="de-DE" dirty="0" err="1"/>
+              <a:rPr lang="de-DE" b="1" dirty="0" err="1"/>
               <a:t>text</a:t>
             </a:r>
             <a:r>
-              <a:rPr lang="de-DE" dirty="0"/>
+              <a:rPr lang="de-DE" b="1" dirty="0"/>
               <a:t> </a:t>
             </a:r>
             <a:r>
-              <a:rPr lang="de-DE" dirty="0" err="1"/>
+              <a:rPr lang="de-DE" b="1" dirty="0" err="1"/>
               <a:t>using</a:t>
             </a:r>
             <a:r>
-              <a:rPr lang="de-DE" dirty="0"/>
+              <a:rPr lang="de-DE" b="1" dirty="0"/>
               <a:t> </a:t>
             </a:r>
             <a:r>
-              <a:rPr lang="de-DE" dirty="0" err="1"/>
+              <a:rPr lang="de-DE" b="1" dirty="0" err="1"/>
               <a:t>various</a:t>
             </a:r>
             <a:r>
-              <a:rPr lang="de-DE" dirty="0"/>
+              <a:rPr lang="de-DE" b="1" dirty="0"/>
               <a:t> </a:t>
             </a:r>
             <a:r>
-              <a:rPr lang="de-DE" dirty="0" err="1"/>
+              <a:rPr lang="de-DE" b="1" dirty="0" err="1"/>
               <a:t>heuristics</a:t>
             </a:r>
             <a:r>
@@ -6780,23 +7128,23 @@
           </a:p>
           <a:p>
             <a:r>
-              <a:rPr lang="de-DE" dirty="0" err="1"/>
+              <a:rPr lang="de-DE" b="1" dirty="0" err="1"/>
               <a:t>Using</a:t>
             </a:r>
             <a:r>
-              <a:rPr lang="de-DE" dirty="0"/>
+              <a:rPr lang="de-DE" b="1" dirty="0"/>
               <a:t> </a:t>
             </a:r>
             <a:r>
-              <a:rPr lang="de-DE" dirty="0" err="1"/>
+              <a:rPr lang="de-DE" b="1" dirty="0" err="1"/>
               <a:t>similarity</a:t>
             </a:r>
             <a:r>
-              <a:rPr lang="de-DE" dirty="0"/>
+              <a:rPr lang="de-DE" b="1" dirty="0"/>
               <a:t> </a:t>
             </a:r>
             <a:r>
-              <a:rPr lang="de-DE" dirty="0" err="1"/>
+              <a:rPr lang="de-DE" b="1" dirty="0" err="1"/>
               <a:t>metrics</a:t>
             </a:r>
             <a:r>
@@ -7082,10 +7430,14 @@
             </a:pPr>
             <a:r>
               <a:rPr lang="en-GB" noProof="0" dirty="0"/>
-              <a:t>For the second part, we created </a:t>
-            </a:r>
-            <a:r>
-              <a:rPr lang="en-GB" noProof="0" dirty="0" err="1"/>
+              <a:t>For the second part, </a:t>
+            </a:r>
+            <a:r>
+              <a:rPr lang="en-GB" b="1" noProof="0" dirty="0"/>
+              <a:t>we created </a:t>
+            </a:r>
+            <a:r>
+              <a:rPr lang="en-GB" b="1" noProof="0" dirty="0" err="1"/>
               <a:t>ArCoTL</a:t>
             </a:r>
             <a:r>
@@ -7116,7 +7468,15 @@
             </a:pPr>
             <a:r>
               <a:rPr lang="en-GB" sz="900" noProof="0" dirty="0"/>
-              <a:t>The approach first transforms input into intermediate representations.</a:t>
+              <a:t>The approach </a:t>
+            </a:r>
+            <a:r>
+              <a:rPr lang="en-GB" sz="900" b="1" noProof="0" dirty="0"/>
+              <a:t>first transforms input </a:t>
+            </a:r>
+            <a:r>
+              <a:rPr lang="en-GB" sz="900" noProof="0" dirty="0"/>
+              <a:t>into intermediate representations.</a:t>
             </a:r>
           </a:p>
           <a:p>
@@ -7126,7 +7486,15 @@
             </a:pPr>
             <a:r>
               <a:rPr lang="en-GB" sz="900" noProof="0" dirty="0"/>
-              <a:t>We do this to be able to uniformly handle input in the main processing steps regardless of specific </a:t>
+              <a:t>We do this to be able to </a:t>
+            </a:r>
+            <a:r>
+              <a:rPr lang="en-GB" sz="900" b="1" noProof="0" dirty="0"/>
+              <a:t>uniformly handle input </a:t>
+            </a:r>
+            <a:r>
+              <a:rPr lang="en-GB" sz="900" noProof="0" dirty="0"/>
+              <a:t>in the main processing steps regardless of specific </a:t>
             </a:r>
             <a:r>
               <a:rPr lang="en-GB" sz="900" noProof="0" dirty="0" err="1"/>
@@ -7177,11 +7545,19 @@
             </a:pPr>
             <a:r>
               <a:rPr lang="en-GB" sz="900" noProof="0" dirty="0"/>
-              <a:t>(*click*) The approach is heuristics-based and we use </a:t>
+              <a:t>(*click*) The approach is </a:t>
+            </a:r>
+            <a:r>
+              <a:rPr lang="en-GB" sz="900" b="1" noProof="0" dirty="0"/>
+              <a:t>heuristics-based and we use </a:t>
+            </a:r>
+            <a:r>
+              <a:rPr lang="en-GB" b="1" noProof="0" dirty="0"/>
+              <a:t>a computational graph </a:t>
             </a:r>
             <a:r>
               <a:rPr lang="en-GB" noProof="0" dirty="0"/>
-              <a:t>a computational graph to orderly execute our heuristics.</a:t>
+              <a:t>to orderly execute our heuristics.</a:t>
             </a:r>
             <a:endParaRPr lang="en-GB" sz="900" noProof="0" dirty="0"/>
           </a:p>
@@ -7224,7 +7600,15 @@
             </a:r>
             <a:r>
               <a:rPr lang="en-GB" sz="900" noProof="0" dirty="0"/>
-              <a:t>he approach uses two kinds of heuristics.</a:t>
+              <a:t>he approach uses </a:t>
+            </a:r>
+            <a:r>
+              <a:rPr lang="en-GB" sz="900" b="1" noProof="0" dirty="0"/>
+              <a:t>two kinds of heuristics</a:t>
+            </a:r>
+            <a:r>
+              <a:rPr lang="en-GB" sz="900" noProof="0" dirty="0"/>
+              <a:t>.</a:t>
             </a:r>
           </a:p>
           <a:p>
@@ -7250,7 +7634,15 @@
             </a:r>
             <a:r>
               <a:rPr lang="en-GB" sz="900" noProof="0" dirty="0"/>
-              <a:t>First, we have standalone heuristics that operate directly on the input data such as components and classes, packages, and paths.</a:t>
+              <a:t>First, we have </a:t>
+            </a:r>
+            <a:r>
+              <a:rPr lang="en-GB" sz="900" b="1" noProof="0" dirty="0"/>
+              <a:t>standalone heuristics </a:t>
+            </a:r>
+            <a:r>
+              <a:rPr lang="en-GB" sz="900" noProof="0" dirty="0"/>
+              <a:t>that operate directly on the input data such as components and classes, packages, and paths.</a:t>
             </a:r>
           </a:p>
           <a:p>
@@ -7260,7 +7652,7 @@
             </a:pPr>
             <a:r>
               <a:rPr lang="en-GB" sz="900" noProof="0" dirty="0"/>
-              <a:t>For example, One simple heuristic compares the names of components and classes.</a:t>
+              <a:t>For example, one simple heuristic compares the names of components and classes.</a:t>
             </a:r>
           </a:p>
           <a:p>
@@ -7286,7 +7678,15 @@
             </a:r>
             <a:r>
               <a:rPr lang="en-GB" sz="900" noProof="0" dirty="0"/>
-              <a:t>Second, the approach uses dependent heuristics.</a:t>
+              <a:t>Second, the approach uses </a:t>
+            </a:r>
+            <a:r>
+              <a:rPr lang="en-GB" sz="900" b="1" noProof="0" dirty="0"/>
+              <a:t>dependent heuristics</a:t>
+            </a:r>
+            <a:r>
+              <a:rPr lang="en-GB" sz="900" noProof="0" dirty="0"/>
+              <a:t>.</a:t>
             </a:r>
           </a:p>
           <a:p>
@@ -7352,7 +7752,15 @@
             </a:r>
             <a:r>
               <a:rPr lang="en-GB" noProof="0" dirty="0"/>
-              <a:t>To combine the results of several heuristics, we use aggregators and filters. For example, one aggregator only keeps the highest similarity score between two entities among a specific set of heuristics.</a:t>
+              <a:t>To combine the results of several heuristics, we use </a:t>
+            </a:r>
+            <a:r>
+              <a:rPr lang="en-GB" b="1" noProof="0" dirty="0"/>
+              <a:t>aggregators and filters</a:t>
+            </a:r>
+            <a:r>
+              <a:rPr lang="en-GB" noProof="0" dirty="0"/>
+              <a:t>. For example, one aggregator only keeps the highest similarity score between two entities among a specific set of heuristics.</a:t>
             </a:r>
           </a:p>
           <a:p>
@@ -16009,7 +16417,7 @@
             <p:ph idx="1"/>
             <p:extLst>
               <p:ext uri="{D42A27DB-BD31-4B8C-83A1-F6EECF244321}">
-                <p14:modId xmlns:p14="http://schemas.microsoft.com/office/powerpoint/2010/main" val="2493725094"/>
+                <p14:modId xmlns:p14="http://schemas.microsoft.com/office/powerpoint/2010/main" val="3129784306"/>
               </p:ext>
             </p:extLst>
           </p:nvPr>
@@ -16204,12 +16612,8 @@
                     <a:lstStyle/>
                     <a:p>
                       <a:r>
-                        <a:rPr lang="de-DE" dirty="0" err="1"/>
-                        <a:t>Avg</a:t>
-                      </a:r>
-                      <a:r>
                         <a:rPr lang="de-DE" dirty="0"/>
-                        <a:t>.</a:t>
+                        <a:t>Average</a:t>
                       </a:r>
                     </a:p>
                   </a:txBody>
@@ -16234,8 +16638,12 @@
                     <a:lstStyle/>
                     <a:p>
                       <a:r>
+                        <a:rPr lang="de-DE" dirty="0" err="1"/>
+                        <a:t>Weighted</a:t>
+                      </a:r>
+                      <a:r>
                         <a:rPr lang="de-DE" dirty="0"/>
-                        <a:t>W. </a:t>
+                        <a:t> </a:t>
                       </a:r>
                       <a:r>
                         <a:rPr lang="de-DE" dirty="0" err="1"/>
@@ -35610,60 +36018,6 @@
       </p:sp>
       <p:sp>
         <p:nvSpPr>
-          <p:cNvPr id="20" name="Rechteck 19">
-            <a:extLst>
-              <a:ext uri="{FF2B5EF4-FFF2-40B4-BE49-F238E27FC236}">
-                <a16:creationId xmlns:a16="http://schemas.microsoft.com/office/drawing/2014/main" id="{B258E496-6CA9-C039-5385-4264EC25105B}"/>
-              </a:ext>
-            </a:extLst>
-          </p:cNvPr>
-          <p:cNvSpPr/>
-          <p:nvPr/>
-        </p:nvSpPr>
-        <p:spPr>
-          <a:xfrm>
-            <a:off x="6223950" y="2636622"/>
-            <a:ext cx="720000" cy="270000"/>
-          </a:xfrm>
-          <a:prstGeom prst="rect">
-            <a:avLst/>
-          </a:prstGeom>
-          <a:solidFill>
-            <a:srgbClr val="397896"/>
-          </a:solidFill>
-          <a:ln>
-            <a:solidFill>
-              <a:schemeClr val="tx1"/>
-            </a:solidFill>
-          </a:ln>
-        </p:spPr>
-        <p:style>
-          <a:lnRef idx="2">
-            <a:schemeClr val="accent1">
-              <a:shade val="15000"/>
-            </a:schemeClr>
-          </a:lnRef>
-          <a:fillRef idx="1">
-            <a:schemeClr val="accent1"/>
-          </a:fillRef>
-          <a:effectRef idx="0">
-            <a:schemeClr val="accent1"/>
-          </a:effectRef>
-          <a:fontRef idx="minor">
-            <a:schemeClr val="lt1"/>
-          </a:fontRef>
-        </p:style>
-        <p:txBody>
-          <a:bodyPr rtlCol="0" anchor="ctr"/>
-          <a:lstStyle/>
-          <a:p>
-            <a:pPr algn="ctr"/>
-            <a:endParaRPr lang="de-DE"/>
-          </a:p>
-        </p:txBody>
-      </p:sp>
-      <p:sp>
-        <p:nvSpPr>
           <p:cNvPr id="21" name="Rechteck 20">
             <a:extLst>
               <a:ext uri="{FF2B5EF4-FFF2-40B4-BE49-F238E27FC236}">
@@ -35684,60 +36038,6 @@
           </a:prstGeom>
           <a:solidFill>
             <a:srgbClr val="397896"/>
-          </a:solidFill>
-          <a:ln>
-            <a:solidFill>
-              <a:schemeClr val="tx1"/>
-            </a:solidFill>
-          </a:ln>
-        </p:spPr>
-        <p:style>
-          <a:lnRef idx="2">
-            <a:schemeClr val="accent1">
-              <a:shade val="15000"/>
-            </a:schemeClr>
-          </a:lnRef>
-          <a:fillRef idx="1">
-            <a:schemeClr val="accent1"/>
-          </a:fillRef>
-          <a:effectRef idx="0">
-            <a:schemeClr val="accent1"/>
-          </a:effectRef>
-          <a:fontRef idx="minor">
-            <a:schemeClr val="lt1"/>
-          </a:fontRef>
-        </p:style>
-        <p:txBody>
-          <a:bodyPr rtlCol="0" anchor="ctr"/>
-          <a:lstStyle/>
-          <a:p>
-            <a:pPr algn="ctr"/>
-            <a:endParaRPr lang="de-DE"/>
-          </a:p>
-        </p:txBody>
-      </p:sp>
-      <p:sp>
-        <p:nvSpPr>
-          <p:cNvPr id="22" name="Rechteck 21">
-            <a:extLst>
-              <a:ext uri="{FF2B5EF4-FFF2-40B4-BE49-F238E27FC236}">
-                <a16:creationId xmlns:a16="http://schemas.microsoft.com/office/drawing/2014/main" id="{030B6743-B674-D74A-E434-10BC0E9F585F}"/>
-              </a:ext>
-            </a:extLst>
-          </p:cNvPr>
-          <p:cNvSpPr/>
-          <p:nvPr/>
-        </p:nvSpPr>
-        <p:spPr>
-          <a:xfrm>
-            <a:off x="6223950" y="3086622"/>
-            <a:ext cx="720000" cy="270000"/>
-          </a:xfrm>
-          <a:prstGeom prst="rect">
-            <a:avLst/>
-          </a:prstGeom>
-          <a:solidFill>
-            <a:srgbClr val="CA705E"/>
           </a:solidFill>
           <a:ln>
             <a:solidFill>
@@ -35941,60 +36241,6 @@
       </p:sp>
       <p:sp>
         <p:nvSpPr>
-          <p:cNvPr id="26" name="Rechteck 25">
-            <a:extLst>
-              <a:ext uri="{FF2B5EF4-FFF2-40B4-BE49-F238E27FC236}">
-                <a16:creationId xmlns:a16="http://schemas.microsoft.com/office/drawing/2014/main" id="{3DC88197-7B12-F03E-77D5-992B74E1CB33}"/>
-              </a:ext>
-            </a:extLst>
-          </p:cNvPr>
-          <p:cNvSpPr/>
-          <p:nvPr/>
-        </p:nvSpPr>
-        <p:spPr>
-          <a:xfrm>
-            <a:off x="5323950" y="3086622"/>
-            <a:ext cx="720000" cy="270000"/>
-          </a:xfrm>
-          <a:prstGeom prst="rect">
-            <a:avLst/>
-          </a:prstGeom>
-          <a:solidFill>
-            <a:srgbClr val="CA705E"/>
-          </a:solidFill>
-          <a:ln>
-            <a:solidFill>
-              <a:schemeClr val="tx1"/>
-            </a:solidFill>
-          </a:ln>
-        </p:spPr>
-        <p:style>
-          <a:lnRef idx="2">
-            <a:schemeClr val="accent1">
-              <a:shade val="15000"/>
-            </a:schemeClr>
-          </a:lnRef>
-          <a:fillRef idx="1">
-            <a:schemeClr val="accent1"/>
-          </a:fillRef>
-          <a:effectRef idx="0">
-            <a:schemeClr val="accent1"/>
-          </a:effectRef>
-          <a:fontRef idx="minor">
-            <a:schemeClr val="lt1"/>
-          </a:fontRef>
-        </p:style>
-        <p:txBody>
-          <a:bodyPr rtlCol="0" anchor="ctr"/>
-          <a:lstStyle/>
-          <a:p>
-            <a:pPr algn="ctr"/>
-            <a:endParaRPr lang="de-DE"/>
-          </a:p>
-        </p:txBody>
-      </p:sp>
-      <p:sp>
-        <p:nvSpPr>
           <p:cNvPr id="27" name="Rechteck 26">
             <a:extLst>
               <a:ext uri="{FF2B5EF4-FFF2-40B4-BE49-F238E27FC236}">
@@ -36174,48 +36420,6 @@
           <a:xfrm>
             <a:off x="5683950" y="2456622"/>
             <a:ext cx="0" cy="180000"/>
-          </a:xfrm>
-          <a:prstGeom prst="straightConnector1">
-            <a:avLst/>
-          </a:prstGeom>
-          <a:ln>
-            <a:tailEnd type="triangle"/>
-          </a:ln>
-        </p:spPr>
-        <p:style>
-          <a:lnRef idx="1">
-            <a:schemeClr val="dk1"/>
-          </a:lnRef>
-          <a:fillRef idx="0">
-            <a:schemeClr val="dk1"/>
-          </a:fillRef>
-          <a:effectRef idx="0">
-            <a:schemeClr val="dk1"/>
-          </a:effectRef>
-          <a:fontRef idx="minor">
-            <a:schemeClr val="tx1"/>
-          </a:fontRef>
-        </p:style>
-      </p:cxnSp>
-      <p:cxnSp>
-        <p:nvCxnSpPr>
-          <p:cNvPr id="35" name="Gerade Verbindung mit Pfeil 34">
-            <a:extLst>
-              <a:ext uri="{FF2B5EF4-FFF2-40B4-BE49-F238E27FC236}">
-                <a16:creationId xmlns:a16="http://schemas.microsoft.com/office/drawing/2014/main" id="{9B067AC6-FFAA-CA68-9219-BC3A8B7FA2FD}"/>
-              </a:ext>
-            </a:extLst>
-          </p:cNvPr>
-          <p:cNvCxnSpPr>
-            <a:cxnSpLocks/>
-            <a:endCxn id="20" idx="0"/>
-          </p:cNvCxnSpPr>
-          <p:nvPr/>
-        </p:nvCxnSpPr>
-        <p:spPr>
-          <a:xfrm>
-            <a:off x="6583950" y="2464418"/>
-            <a:ext cx="0" cy="172204"/>
           </a:xfrm>
           <a:prstGeom prst="straightConnector1">
             <a:avLst/>
@@ -36300,92 +36504,6 @@
           <a:xfrm>
             <a:off x="8383950" y="2464418"/>
             <a:ext cx="0" cy="172204"/>
-          </a:xfrm>
-          <a:prstGeom prst="straightConnector1">
-            <a:avLst/>
-          </a:prstGeom>
-          <a:ln>
-            <a:tailEnd type="triangle"/>
-          </a:ln>
-        </p:spPr>
-        <p:style>
-          <a:lnRef idx="1">
-            <a:schemeClr val="dk1"/>
-          </a:lnRef>
-          <a:fillRef idx="0">
-            <a:schemeClr val="dk1"/>
-          </a:fillRef>
-          <a:effectRef idx="0">
-            <a:schemeClr val="dk1"/>
-          </a:effectRef>
-          <a:fontRef idx="minor">
-            <a:schemeClr val="tx1"/>
-          </a:fontRef>
-        </p:style>
-      </p:cxnSp>
-      <p:cxnSp>
-        <p:nvCxnSpPr>
-          <p:cNvPr id="45" name="Gerade Verbindung mit Pfeil 44">
-            <a:extLst>
-              <a:ext uri="{FF2B5EF4-FFF2-40B4-BE49-F238E27FC236}">
-                <a16:creationId xmlns:a16="http://schemas.microsoft.com/office/drawing/2014/main" id="{34F50220-A739-7AB2-F29E-EBAD5454A7E6}"/>
-              </a:ext>
-            </a:extLst>
-          </p:cNvPr>
-          <p:cNvCxnSpPr>
-            <a:cxnSpLocks/>
-            <a:stCxn id="16" idx="2"/>
-            <a:endCxn id="26" idx="0"/>
-          </p:cNvCxnSpPr>
-          <p:nvPr/>
-        </p:nvCxnSpPr>
-        <p:spPr>
-          <a:xfrm>
-            <a:off x="5683950" y="2906622"/>
-            <a:ext cx="0" cy="180000"/>
-          </a:xfrm>
-          <a:prstGeom prst="straightConnector1">
-            <a:avLst/>
-          </a:prstGeom>
-          <a:ln>
-            <a:tailEnd type="triangle"/>
-          </a:ln>
-        </p:spPr>
-        <p:style>
-          <a:lnRef idx="1">
-            <a:schemeClr val="dk1"/>
-          </a:lnRef>
-          <a:fillRef idx="0">
-            <a:schemeClr val="dk1"/>
-          </a:fillRef>
-          <a:effectRef idx="0">
-            <a:schemeClr val="dk1"/>
-          </a:effectRef>
-          <a:fontRef idx="minor">
-            <a:schemeClr val="tx1"/>
-          </a:fontRef>
-        </p:style>
-      </p:cxnSp>
-      <p:cxnSp>
-        <p:nvCxnSpPr>
-          <p:cNvPr id="51" name="Gerade Verbindung mit Pfeil 50">
-            <a:extLst>
-              <a:ext uri="{FF2B5EF4-FFF2-40B4-BE49-F238E27FC236}">
-                <a16:creationId xmlns:a16="http://schemas.microsoft.com/office/drawing/2014/main" id="{F055BA5A-61C1-4AFA-58C5-216E4F3C269F}"/>
-              </a:ext>
-            </a:extLst>
-          </p:cNvPr>
-          <p:cNvCxnSpPr>
-            <a:cxnSpLocks/>
-            <a:stCxn id="20" idx="2"/>
-            <a:endCxn id="22" idx="0"/>
-          </p:cNvCxnSpPr>
-          <p:nvPr/>
-        </p:nvCxnSpPr>
-        <p:spPr>
-          <a:xfrm>
-            <a:off x="6583950" y="2906622"/>
-            <a:ext cx="0" cy="180000"/>
           </a:xfrm>
           <a:prstGeom prst="straightConnector1">
             <a:avLst/>
@@ -36504,14 +36622,13 @@
           </p:cNvPr>
           <p:cNvCxnSpPr>
             <a:cxnSpLocks/>
-            <a:stCxn id="26" idx="2"/>
           </p:cNvCxnSpPr>
           <p:nvPr/>
         </p:nvCxnSpPr>
         <p:spPr>
           <a:xfrm>
-            <a:off x="5683950" y="3356622"/>
-            <a:ext cx="0" cy="180000"/>
+            <a:off x="5683950" y="2906622"/>
+            <a:ext cx="0" cy="630000"/>
           </a:xfrm>
           <a:prstGeom prst="straightConnector1">
             <a:avLst/>
@@ -36546,14 +36663,13 @@
           </p:cNvPr>
           <p:cNvCxnSpPr>
             <a:cxnSpLocks/>
-            <a:stCxn id="22" idx="2"/>
           </p:cNvCxnSpPr>
           <p:nvPr/>
         </p:nvCxnSpPr>
         <p:spPr>
           <a:xfrm>
-            <a:off x="6583950" y="3356622"/>
-            <a:ext cx="0" cy="186428"/>
+            <a:off x="6583950" y="2456622"/>
+            <a:ext cx="0" cy="1086428"/>
           </a:xfrm>
           <a:prstGeom prst="straightConnector1">
             <a:avLst/>
@@ -37078,7 +37194,7 @@
                                           </p:stCondLst>
                                         </p:cTn>
                                         <p:tgtEl>
-                                          <p:spTgt spid="20"/>
+                                          <p:spTgt spid="21"/>
                                         </p:tgtEl>
                                         <p:attrNameLst>
                                           <p:attrName>style.visibility</p:attrName>
@@ -37105,7 +37221,7 @@
                                           </p:stCondLst>
                                         </p:cTn>
                                         <p:tgtEl>
-                                          <p:spTgt spid="21"/>
+                                          <p:spTgt spid="25"/>
                                         </p:tgtEl>
                                         <p:attrNameLst>
                                           <p:attrName>style.visibility</p:attrName>
@@ -37119,7 +37235,7 @@
                                 </p:cTn>
                               </p:par>
                               <p:par>
-                                <p:cTn id="23" presetID="1" presetClass="entr" presetSubtype="0" fill="hold" grpId="0" nodeType="withEffect">
+                                <p:cTn id="23" presetID="1" presetClass="entr" presetSubtype="0" fill="hold" nodeType="withEffect">
                                   <p:stCondLst>
                                     <p:cond delay="0"/>
                                   </p:stCondLst>
@@ -37132,7 +37248,7 @@
                                           </p:stCondLst>
                                         </p:cTn>
                                         <p:tgtEl>
-                                          <p:spTgt spid="25"/>
+                                          <p:spTgt spid="32"/>
                                         </p:tgtEl>
                                         <p:attrNameLst>
                                           <p:attrName>style.visibility</p:attrName>
@@ -37159,7 +37275,7 @@
                                           </p:stCondLst>
                                         </p:cTn>
                                         <p:tgtEl>
-                                          <p:spTgt spid="32"/>
+                                          <p:spTgt spid="38"/>
                                         </p:tgtEl>
                                         <p:attrNameLst>
                                           <p:attrName>style.visibility</p:attrName>
@@ -37186,60 +37302,6 @@
                                           </p:stCondLst>
                                         </p:cTn>
                                         <p:tgtEl>
-                                          <p:spTgt spid="35"/>
-                                        </p:tgtEl>
-                                        <p:attrNameLst>
-                                          <p:attrName>style.visibility</p:attrName>
-                                        </p:attrNameLst>
-                                      </p:cBhvr>
-                                      <p:to>
-                                        <p:strVal val="visible"/>
-                                      </p:to>
-                                    </p:set>
-                                  </p:childTnLst>
-                                </p:cTn>
-                              </p:par>
-                              <p:par>
-                                <p:cTn id="29" presetID="1" presetClass="entr" presetSubtype="0" fill="hold" nodeType="withEffect">
-                                  <p:stCondLst>
-                                    <p:cond delay="0"/>
-                                  </p:stCondLst>
-                                  <p:childTnLst>
-                                    <p:set>
-                                      <p:cBhvr>
-                                        <p:cTn id="30" dur="1" fill="hold">
-                                          <p:stCondLst>
-                                            <p:cond delay="0"/>
-                                          </p:stCondLst>
-                                        </p:cTn>
-                                        <p:tgtEl>
-                                          <p:spTgt spid="38"/>
-                                        </p:tgtEl>
-                                        <p:attrNameLst>
-                                          <p:attrName>style.visibility</p:attrName>
-                                        </p:attrNameLst>
-                                      </p:cBhvr>
-                                      <p:to>
-                                        <p:strVal val="visible"/>
-                                      </p:to>
-                                    </p:set>
-                                  </p:childTnLst>
-                                </p:cTn>
-                              </p:par>
-                              <p:par>
-                                <p:cTn id="31" presetID="1" presetClass="entr" presetSubtype="0" fill="hold" nodeType="withEffect">
-                                  <p:stCondLst>
-                                    <p:cond delay="0"/>
-                                  </p:stCondLst>
-                                  <p:childTnLst>
-                                    <p:set>
-                                      <p:cBhvr>
-                                        <p:cTn id="32" dur="1" fill="hold">
-                                          <p:stCondLst>
-                                            <p:cond delay="0"/>
-                                          </p:stCondLst>
-                                        </p:cTn>
-                                        <p:tgtEl>
                                           <p:spTgt spid="41"/>
                                         </p:tgtEl>
                                         <p:attrNameLst>
@@ -37260,19 +37322,77 @@
                     </p:cTn>
                   </p:par>
                   <p:par>
-                    <p:cTn id="33" fill="hold">
+                    <p:cTn id="29" fill="hold">
                       <p:stCondLst>
                         <p:cond delay="indefinite"/>
                       </p:stCondLst>
                       <p:childTnLst>
                         <p:par>
-                          <p:cTn id="34" fill="hold">
+                          <p:cTn id="30" fill="hold">
                             <p:stCondLst>
                               <p:cond delay="0"/>
                             </p:stCondLst>
                             <p:childTnLst>
                               <p:par>
-                                <p:cTn id="35" presetID="1" presetClass="entr" presetSubtype="0" fill="hold" nodeType="clickEffect">
+                                <p:cTn id="31" presetID="1" presetClass="entr" presetSubtype="0" fill="hold" nodeType="clickEffect">
+                                  <p:stCondLst>
+                                    <p:cond delay="0"/>
+                                  </p:stCondLst>
+                                  <p:childTnLst>
+                                    <p:set>
+                                      <p:cBhvr>
+                                        <p:cTn id="32" dur="1" fill="hold">
+                                          <p:stCondLst>
+                                            <p:cond delay="0"/>
+                                          </p:stCondLst>
+                                        </p:cTn>
+                                        <p:tgtEl>
+                                          <p:spTgt spid="2">
+                                            <p:txEl>
+                                              <p:pRg st="6" end="6"/>
+                                            </p:txEl>
+                                          </p:spTgt>
+                                        </p:tgtEl>
+                                        <p:attrNameLst>
+                                          <p:attrName>style.visibility</p:attrName>
+                                        </p:attrNameLst>
+                                      </p:cBhvr>
+                                      <p:to>
+                                        <p:strVal val="visible"/>
+                                      </p:to>
+                                    </p:set>
+                                  </p:childTnLst>
+                                </p:cTn>
+                              </p:par>
+                              <p:par>
+                                <p:cTn id="33" presetID="1" presetClass="entr" presetSubtype="0" fill="hold" grpId="0" nodeType="withEffect">
+                                  <p:stCondLst>
+                                    <p:cond delay="0"/>
+                                  </p:stCondLst>
+                                  <p:childTnLst>
+                                    <p:set>
+                                      <p:cBhvr>
+                                        <p:cTn id="34" dur="1" fill="hold">
+                                          <p:stCondLst>
+                                            <p:cond delay="0"/>
+                                          </p:stCondLst>
+                                        </p:cTn>
+                                        <p:tgtEl>
+                                          <p:spTgt spid="15"/>
+                                        </p:tgtEl>
+                                        <p:attrNameLst>
+                                          <p:attrName>style.visibility</p:attrName>
+                                        </p:attrNameLst>
+                                      </p:cBhvr>
+                                      <p:to>
+                                        <p:strVal val="visible"/>
+                                      </p:to>
+                                    </p:set>
+                                  </p:childTnLst>
+                                </p:cTn>
+                              </p:par>
+                              <p:par>
+                                <p:cTn id="35" presetID="1" presetClass="entr" presetSubtype="0" fill="hold" grpId="0" nodeType="withEffect">
                                   <p:stCondLst>
                                     <p:cond delay="0"/>
                                   </p:stCondLst>
@@ -37285,11 +37405,7 @@
                                           </p:stCondLst>
                                         </p:cTn>
                                         <p:tgtEl>
-                                          <p:spTgt spid="2">
-                                            <p:txEl>
-                                              <p:pRg st="6" end="6"/>
-                                            </p:txEl>
-                                          </p:spTgt>
+                                          <p:spTgt spid="27"/>
                                         </p:tgtEl>
                                         <p:attrNameLst>
                                           <p:attrName>style.visibility</p:attrName>
@@ -37316,7 +37432,7 @@
                                           </p:stCondLst>
                                         </p:cTn>
                                         <p:tgtEl>
-                                          <p:spTgt spid="15"/>
+                                          <p:spTgt spid="28"/>
                                         </p:tgtEl>
                                         <p:attrNameLst>
                                           <p:attrName>style.visibility</p:attrName>
@@ -37330,7 +37446,7 @@
                                 </p:cTn>
                               </p:par>
                               <p:par>
-                                <p:cTn id="39" presetID="1" presetClass="entr" presetSubtype="0" fill="hold" grpId="0" nodeType="withEffect">
+                                <p:cTn id="39" presetID="1" presetClass="entr" presetSubtype="0" fill="hold" nodeType="withEffect">
                                   <p:stCondLst>
                                     <p:cond delay="0"/>
                                   </p:stCondLst>
@@ -37343,7 +37459,7 @@
                                           </p:stCondLst>
                                         </p:cTn>
                                         <p:tgtEl>
-                                          <p:spTgt spid="27"/>
+                                          <p:spTgt spid="66"/>
                                         </p:tgtEl>
                                         <p:attrNameLst>
                                           <p:attrName>style.visibility</p:attrName>
@@ -37357,7 +37473,7 @@
                                 </p:cTn>
                               </p:par>
                               <p:par>
-                                <p:cTn id="41" presetID="1" presetClass="entr" presetSubtype="0" fill="hold" grpId="0" nodeType="withEffect">
+                                <p:cTn id="41" presetID="1" presetClass="entr" presetSubtype="0" fill="hold" nodeType="withEffect">
                                   <p:stCondLst>
                                     <p:cond delay="0"/>
                                   </p:stCondLst>
@@ -37370,7 +37486,7 @@
                                           </p:stCondLst>
                                         </p:cTn>
                                         <p:tgtEl>
-                                          <p:spTgt spid="28"/>
+                                          <p:spTgt spid="63"/>
                                         </p:tgtEl>
                                         <p:attrNameLst>
                                           <p:attrName>style.visibility</p:attrName>
@@ -37446,7 +37562,7 @@
                                           </p:stCondLst>
                                         </p:cTn>
                                         <p:tgtEl>
-                                          <p:spTgt spid="26"/>
+                                          <p:spTgt spid="24"/>
                                         </p:tgtEl>
                                         <p:attrNameLst>
                                           <p:attrName>style.visibility</p:attrName>
@@ -37473,7 +37589,7 @@
                                           </p:stCondLst>
                                         </p:cTn>
                                         <p:tgtEl>
-                                          <p:spTgt spid="22"/>
+                                          <p:spTgt spid="29"/>
                                         </p:tgtEl>
                                         <p:attrNameLst>
                                           <p:attrName>style.visibility</p:attrName>
@@ -37487,7 +37603,7 @@
                                 </p:cTn>
                               </p:par>
                               <p:par>
-                                <p:cTn id="51" presetID="1" presetClass="entr" presetSubtype="0" fill="hold" grpId="0" nodeType="withEffect">
+                                <p:cTn id="51" presetID="1" presetClass="entr" presetSubtype="0" fill="hold" nodeType="withEffect">
                                   <p:stCondLst>
                                     <p:cond delay="0"/>
                                   </p:stCondLst>
@@ -37500,7 +37616,7 @@
                                           </p:stCondLst>
                                         </p:cTn>
                                         <p:tgtEl>
-                                          <p:spTgt spid="24"/>
+                                          <p:spTgt spid="55"/>
                                         </p:tgtEl>
                                         <p:attrNameLst>
                                           <p:attrName>style.visibility</p:attrName>
@@ -37514,7 +37630,7 @@
                                 </p:cTn>
                               </p:par>
                               <p:par>
-                                <p:cTn id="53" presetID="1" presetClass="entr" presetSubtype="0" fill="hold" grpId="0" nodeType="withEffect">
+                                <p:cTn id="53" presetID="1" presetClass="entr" presetSubtype="0" fill="hold" nodeType="withEffect">
                                   <p:stCondLst>
                                     <p:cond delay="0"/>
                                   </p:stCondLst>
@@ -37527,7 +37643,7 @@
                                           </p:stCondLst>
                                         </p:cTn>
                                         <p:tgtEl>
-                                          <p:spTgt spid="29"/>
+                                          <p:spTgt spid="58"/>
                                         </p:tgtEl>
                                         <p:attrNameLst>
                                           <p:attrName>style.visibility</p:attrName>
@@ -37554,7 +37670,7 @@
                                           </p:stCondLst>
                                         </p:cTn>
                                         <p:tgtEl>
-                                          <p:spTgt spid="45"/>
+                                          <p:spTgt spid="69"/>
                                         </p:tgtEl>
                                         <p:attrNameLst>
                                           <p:attrName>style.visibility</p:attrName>
@@ -37581,7 +37697,7 @@
                                           </p:stCondLst>
                                         </p:cTn>
                                         <p:tgtEl>
-                                          <p:spTgt spid="51"/>
+                                          <p:spTgt spid="76"/>
                                         </p:tgtEl>
                                         <p:attrNameLst>
                                           <p:attrName>style.visibility</p:attrName>
@@ -37608,7 +37724,7 @@
                                           </p:stCondLst>
                                         </p:cTn>
                                         <p:tgtEl>
-                                          <p:spTgt spid="55"/>
+                                          <p:spTgt spid="79"/>
                                         </p:tgtEl>
                                         <p:attrNameLst>
                                           <p:attrName>style.visibility</p:attrName>
@@ -37635,7 +37751,7 @@
                                           </p:stCondLst>
                                         </p:cTn>
                                         <p:tgtEl>
-                                          <p:spTgt spid="58"/>
+                                          <p:spTgt spid="81"/>
                                         </p:tgtEl>
                                         <p:attrNameLst>
                                           <p:attrName>style.visibility</p:attrName>
@@ -37662,7 +37778,7 @@
                                           </p:stCondLst>
                                         </p:cTn>
                                         <p:tgtEl>
-                                          <p:spTgt spid="63"/>
+                                          <p:spTgt spid="86"/>
                                         </p:tgtEl>
                                         <p:attrNameLst>
                                           <p:attrName>style.visibility</p:attrName>
@@ -37684,168 +37800,6 @@
                                     <p:set>
                                       <p:cBhvr>
                                         <p:cTn id="66" dur="1" fill="hold">
-                                          <p:stCondLst>
-                                            <p:cond delay="0"/>
-                                          </p:stCondLst>
-                                        </p:cTn>
-                                        <p:tgtEl>
-                                          <p:spTgt spid="66"/>
-                                        </p:tgtEl>
-                                        <p:attrNameLst>
-                                          <p:attrName>style.visibility</p:attrName>
-                                        </p:attrNameLst>
-                                      </p:cBhvr>
-                                      <p:to>
-                                        <p:strVal val="visible"/>
-                                      </p:to>
-                                    </p:set>
-                                  </p:childTnLst>
-                                </p:cTn>
-                              </p:par>
-                              <p:par>
-                                <p:cTn id="67" presetID="1" presetClass="entr" presetSubtype="0" fill="hold" nodeType="withEffect">
-                                  <p:stCondLst>
-                                    <p:cond delay="0"/>
-                                  </p:stCondLst>
-                                  <p:childTnLst>
-                                    <p:set>
-                                      <p:cBhvr>
-                                        <p:cTn id="68" dur="1" fill="hold">
-                                          <p:stCondLst>
-                                            <p:cond delay="0"/>
-                                          </p:stCondLst>
-                                        </p:cTn>
-                                        <p:tgtEl>
-                                          <p:spTgt spid="69"/>
-                                        </p:tgtEl>
-                                        <p:attrNameLst>
-                                          <p:attrName>style.visibility</p:attrName>
-                                        </p:attrNameLst>
-                                      </p:cBhvr>
-                                      <p:to>
-                                        <p:strVal val="visible"/>
-                                      </p:to>
-                                    </p:set>
-                                  </p:childTnLst>
-                                </p:cTn>
-                              </p:par>
-                              <p:par>
-                                <p:cTn id="69" presetID="1" presetClass="entr" presetSubtype="0" fill="hold" nodeType="withEffect">
-                                  <p:stCondLst>
-                                    <p:cond delay="0"/>
-                                  </p:stCondLst>
-                                  <p:childTnLst>
-                                    <p:set>
-                                      <p:cBhvr>
-                                        <p:cTn id="70" dur="1" fill="hold">
-                                          <p:stCondLst>
-                                            <p:cond delay="0"/>
-                                          </p:stCondLst>
-                                        </p:cTn>
-                                        <p:tgtEl>
-                                          <p:spTgt spid="76"/>
-                                        </p:tgtEl>
-                                        <p:attrNameLst>
-                                          <p:attrName>style.visibility</p:attrName>
-                                        </p:attrNameLst>
-                                      </p:cBhvr>
-                                      <p:to>
-                                        <p:strVal val="visible"/>
-                                      </p:to>
-                                    </p:set>
-                                  </p:childTnLst>
-                                </p:cTn>
-                              </p:par>
-                              <p:par>
-                                <p:cTn id="71" presetID="1" presetClass="entr" presetSubtype="0" fill="hold" nodeType="withEffect">
-                                  <p:stCondLst>
-                                    <p:cond delay="0"/>
-                                  </p:stCondLst>
-                                  <p:childTnLst>
-                                    <p:set>
-                                      <p:cBhvr>
-                                        <p:cTn id="72" dur="1" fill="hold">
-                                          <p:stCondLst>
-                                            <p:cond delay="0"/>
-                                          </p:stCondLst>
-                                        </p:cTn>
-                                        <p:tgtEl>
-                                          <p:spTgt spid="79"/>
-                                        </p:tgtEl>
-                                        <p:attrNameLst>
-                                          <p:attrName>style.visibility</p:attrName>
-                                        </p:attrNameLst>
-                                      </p:cBhvr>
-                                      <p:to>
-                                        <p:strVal val="visible"/>
-                                      </p:to>
-                                    </p:set>
-                                  </p:childTnLst>
-                                </p:cTn>
-                              </p:par>
-                              <p:par>
-                                <p:cTn id="73" presetID="1" presetClass="entr" presetSubtype="0" fill="hold" nodeType="withEffect">
-                                  <p:stCondLst>
-                                    <p:cond delay="0"/>
-                                  </p:stCondLst>
-                                  <p:childTnLst>
-                                    <p:set>
-                                      <p:cBhvr>
-                                        <p:cTn id="74" dur="1" fill="hold">
-                                          <p:stCondLst>
-                                            <p:cond delay="0"/>
-                                          </p:stCondLst>
-                                        </p:cTn>
-                                        <p:tgtEl>
-                                          <p:spTgt spid="81"/>
-                                        </p:tgtEl>
-                                        <p:attrNameLst>
-                                          <p:attrName>style.visibility</p:attrName>
-                                        </p:attrNameLst>
-                                      </p:cBhvr>
-                                      <p:to>
-                                        <p:strVal val="visible"/>
-                                      </p:to>
-                                    </p:set>
-                                  </p:childTnLst>
-                                </p:cTn>
-                              </p:par>
-                              <p:par>
-                                <p:cTn id="75" presetID="1" presetClass="entr" presetSubtype="0" fill="hold" nodeType="withEffect">
-                                  <p:stCondLst>
-                                    <p:cond delay="0"/>
-                                  </p:stCondLst>
-                                  <p:childTnLst>
-                                    <p:set>
-                                      <p:cBhvr>
-                                        <p:cTn id="76" dur="1" fill="hold">
-                                          <p:stCondLst>
-                                            <p:cond delay="0"/>
-                                          </p:stCondLst>
-                                        </p:cTn>
-                                        <p:tgtEl>
-                                          <p:spTgt spid="86"/>
-                                        </p:tgtEl>
-                                        <p:attrNameLst>
-                                          <p:attrName>style.visibility</p:attrName>
-                                        </p:attrNameLst>
-                                      </p:cBhvr>
-                                      <p:to>
-                                        <p:strVal val="visible"/>
-                                      </p:to>
-                                    </p:set>
-                                  </p:childTnLst>
-                                </p:cTn>
-                              </p:par>
-                              <p:par>
-                                <p:cTn id="77" presetID="1" presetClass="entr" presetSubtype="0" fill="hold" nodeType="withEffect">
-                                  <p:stCondLst>
-                                    <p:cond delay="0"/>
-                                  </p:stCondLst>
-                                  <p:childTnLst>
-                                    <p:set>
-                                      <p:cBhvr>
-                                        <p:cTn id="78" dur="1" fill="hold">
                                           <p:stCondLst>
                                             <p:cond delay="0"/>
                                           </p:stCondLst>
@@ -37895,13 +37849,10 @@
       <p:bldP spid="15" grpId="0" animBg="1"/>
       <p:bldP spid="16" grpId="0" animBg="1"/>
       <p:bldP spid="17" grpId="0" animBg="1"/>
-      <p:bldP spid="20" grpId="0" animBg="1"/>
       <p:bldP spid="21" grpId="0" animBg="1"/>
-      <p:bldP spid="22" grpId="0" animBg="1"/>
       <p:bldP spid="23" grpId="0" animBg="1"/>
       <p:bldP spid="24" grpId="0" animBg="1"/>
       <p:bldP spid="25" grpId="0" animBg="1"/>
-      <p:bldP spid="26" grpId="0" animBg="1"/>
       <p:bldP spid="27" grpId="0" animBg="1"/>
       <p:bldP spid="28" grpId="0" animBg="1"/>
       <p:bldP spid="29" grpId="0" animBg="1"/>

</xml_diff>